<commit_message>
adding data updating slides 11
</commit_message>
<xml_diff>
--- a/STT465_11.pptx
+++ b/STT465_11.pptx
@@ -5,7 +5,7 @@
     <p:sldMasterId id="2147483648" r:id="rId1"/>
   </p:sldMasterIdLst>
   <p:notesMasterIdLst>
-    <p:notesMasterId r:id="rId8"/>
+    <p:notesMasterId r:id="rId10"/>
   </p:notesMasterIdLst>
   <p:sldIdLst>
     <p:sldId id="338" r:id="rId2"/>
@@ -14,6 +14,8 @@
     <p:sldId id="346" r:id="rId5"/>
     <p:sldId id="348" r:id="rId6"/>
     <p:sldId id="349" r:id="rId7"/>
+    <p:sldId id="350" r:id="rId8"/>
+    <p:sldId id="351" r:id="rId9"/>
   </p:sldIdLst>
   <p:sldSz cx="9144000" cy="6858000" type="screen4x3"/>
   <p:notesSz cx="6858000" cy="9144000"/>
@@ -204,7 +206,7 @@
             <a:fld id="{EC2AD4C0-0FC1-44D9-A720-D776D6428221}" type="datetimeFigureOut">
               <a:rPr lang="en-US" smtClean="0"/>
               <a:pPr/>
-              <a:t>11/2/15</a:t>
+              <a:t>11/4/15</a:t>
             </a:fld>
             <a:endParaRPr lang="en-US"/>
           </a:p>
@@ -967,6 +969,170 @@
 </p:notes>
 </file>
 
+<file path=ppt/notesSlides/notesSlide7.xml><?xml version="1.0" encoding="utf-8"?>
+<p:notes xmlns:a="http://schemas.openxmlformats.org/drawingml/2006/main" xmlns:r="http://schemas.openxmlformats.org/officeDocument/2006/relationships" xmlns:p="http://schemas.openxmlformats.org/presentationml/2006/main">
+  <p:cSld>
+    <p:spTree>
+      <p:nvGrpSpPr>
+        <p:cNvPr id="1" name=""/>
+        <p:cNvGrpSpPr/>
+        <p:nvPr/>
+      </p:nvGrpSpPr>
+      <p:grpSpPr>
+        <a:xfrm>
+          <a:off x="0" y="0"/>
+          <a:ext cx="0" cy="0"/>
+          <a:chOff x="0" y="0"/>
+          <a:chExt cx="0" cy="0"/>
+        </a:xfrm>
+      </p:grpSpPr>
+      <p:sp>
+        <p:nvSpPr>
+          <p:cNvPr id="2" name="Slide Image Placeholder 1"/>
+          <p:cNvSpPr>
+            <a:spLocks noGrp="1" noRot="1" noChangeAspect="1"/>
+          </p:cNvSpPr>
+          <p:nvPr>
+            <p:ph type="sldImg"/>
+          </p:nvPr>
+        </p:nvSpPr>
+        <p:spPr/>
+      </p:sp>
+      <p:sp>
+        <p:nvSpPr>
+          <p:cNvPr id="3" name="Notes Placeholder 2"/>
+          <p:cNvSpPr>
+            <a:spLocks noGrp="1"/>
+          </p:cNvSpPr>
+          <p:nvPr>
+            <p:ph type="body" idx="1"/>
+          </p:nvPr>
+        </p:nvSpPr>
+        <p:spPr/>
+        <p:txBody>
+          <a:bodyPr>
+            <a:normAutofit/>
+          </a:bodyPr>
+          <a:lstStyle/>
+          <a:p>
+            <a:endParaRPr lang="en-US" dirty="0"/>
+          </a:p>
+        </p:txBody>
+      </p:sp>
+      <p:sp>
+        <p:nvSpPr>
+          <p:cNvPr id="4" name="Slide Number Placeholder 3"/>
+          <p:cNvSpPr>
+            <a:spLocks noGrp="1"/>
+          </p:cNvSpPr>
+          <p:nvPr>
+            <p:ph type="sldNum" sz="quarter" idx="10"/>
+          </p:nvPr>
+        </p:nvSpPr>
+        <p:spPr/>
+        <p:txBody>
+          <a:bodyPr/>
+          <a:lstStyle/>
+          <a:p>
+            <a:fld id="{CACBEE2F-8C26-493F-9430-82D1D1B7C623}" type="slidenum">
+              <a:rPr lang="en-US" smtClean="0"/>
+              <a:pPr/>
+              <a:t>7</a:t>
+            </a:fld>
+            <a:endParaRPr lang="en-US"/>
+          </a:p>
+        </p:txBody>
+      </p:sp>
+    </p:spTree>
+  </p:cSld>
+  <p:clrMapOvr>
+    <a:masterClrMapping/>
+  </p:clrMapOvr>
+</p:notes>
+</file>
+
+<file path=ppt/notesSlides/notesSlide8.xml><?xml version="1.0" encoding="utf-8"?>
+<p:notes xmlns:a="http://schemas.openxmlformats.org/drawingml/2006/main" xmlns:r="http://schemas.openxmlformats.org/officeDocument/2006/relationships" xmlns:p="http://schemas.openxmlformats.org/presentationml/2006/main">
+  <p:cSld>
+    <p:spTree>
+      <p:nvGrpSpPr>
+        <p:cNvPr id="1" name=""/>
+        <p:cNvGrpSpPr/>
+        <p:nvPr/>
+      </p:nvGrpSpPr>
+      <p:grpSpPr>
+        <a:xfrm>
+          <a:off x="0" y="0"/>
+          <a:ext cx="0" cy="0"/>
+          <a:chOff x="0" y="0"/>
+          <a:chExt cx="0" cy="0"/>
+        </a:xfrm>
+      </p:grpSpPr>
+      <p:sp>
+        <p:nvSpPr>
+          <p:cNvPr id="2" name="Slide Image Placeholder 1"/>
+          <p:cNvSpPr>
+            <a:spLocks noGrp="1" noRot="1" noChangeAspect="1"/>
+          </p:cNvSpPr>
+          <p:nvPr>
+            <p:ph type="sldImg"/>
+          </p:nvPr>
+        </p:nvSpPr>
+        <p:spPr/>
+      </p:sp>
+      <p:sp>
+        <p:nvSpPr>
+          <p:cNvPr id="3" name="Notes Placeholder 2"/>
+          <p:cNvSpPr>
+            <a:spLocks noGrp="1"/>
+          </p:cNvSpPr>
+          <p:nvPr>
+            <p:ph type="body" idx="1"/>
+          </p:nvPr>
+        </p:nvSpPr>
+        <p:spPr/>
+        <p:txBody>
+          <a:bodyPr>
+            <a:normAutofit/>
+          </a:bodyPr>
+          <a:lstStyle/>
+          <a:p>
+            <a:endParaRPr lang="en-US" dirty="0"/>
+          </a:p>
+        </p:txBody>
+      </p:sp>
+      <p:sp>
+        <p:nvSpPr>
+          <p:cNvPr id="4" name="Slide Number Placeholder 3"/>
+          <p:cNvSpPr>
+            <a:spLocks noGrp="1"/>
+          </p:cNvSpPr>
+          <p:nvPr>
+            <p:ph type="sldNum" sz="quarter" idx="10"/>
+          </p:nvPr>
+        </p:nvSpPr>
+        <p:spPr/>
+        <p:txBody>
+          <a:bodyPr/>
+          <a:lstStyle/>
+          <a:p>
+            <a:fld id="{CACBEE2F-8C26-493F-9430-82D1D1B7C623}" type="slidenum">
+              <a:rPr lang="en-US" smtClean="0"/>
+              <a:pPr/>
+              <a:t>8</a:t>
+            </a:fld>
+            <a:endParaRPr lang="en-US"/>
+          </a:p>
+        </p:txBody>
+      </p:sp>
+    </p:spTree>
+  </p:cSld>
+  <p:clrMapOvr>
+    <a:masterClrMapping/>
+  </p:clrMapOvr>
+</p:notes>
+</file>
+
 <file path=ppt/slideLayouts/slideLayout1.xml><?xml version="1.0" encoding="utf-8"?>
 <p:sldLayout xmlns:a="http://schemas.openxmlformats.org/drawingml/2006/main" xmlns:r="http://schemas.openxmlformats.org/officeDocument/2006/relationships" xmlns:p="http://schemas.openxmlformats.org/presentationml/2006/main" type="title" preserve="1">
   <p:cSld name="Title Slide">
@@ -1149,7 +1315,7 @@
             <a:fld id="{F9C811E6-0209-4075-80E7-F5953C8ECEE3}" type="datetime1">
               <a:rPr lang="en-US" smtClean="0"/>
               <a:pPr/>
-              <a:t>11/2/15</a:t>
+              <a:t>11/4/15</a:t>
             </a:fld>
             <a:endParaRPr lang="en-US"/>
           </a:p>
@@ -1320,7 +1486,7 @@
             <a:fld id="{648E6BB1-E6D9-4EE7-828F-046F7223761D}" type="datetime1">
               <a:rPr lang="en-US" smtClean="0"/>
               <a:pPr/>
-              <a:t>11/2/15</a:t>
+              <a:t>11/4/15</a:t>
             </a:fld>
             <a:endParaRPr lang="en-US"/>
           </a:p>
@@ -1501,7 +1667,7 @@
             <a:fld id="{B4B9C580-A780-4D76-B2D1-C34F1DA97DF0}" type="datetime1">
               <a:rPr lang="en-US" smtClean="0"/>
               <a:pPr/>
-              <a:t>11/2/15</a:t>
+              <a:t>11/4/15</a:t>
             </a:fld>
             <a:endParaRPr lang="en-US"/>
           </a:p>
@@ -1672,7 +1838,7 @@
             <a:fld id="{EB19DDAF-3255-4785-974C-BB4FAF02D67E}" type="datetime1">
               <a:rPr lang="en-US" smtClean="0"/>
               <a:pPr/>
-              <a:t>11/2/15</a:t>
+              <a:t>11/4/15</a:t>
             </a:fld>
             <a:endParaRPr lang="en-US"/>
           </a:p>
@@ -1919,7 +2085,7 @@
             <a:fld id="{C344AF86-11D1-4E84-BA60-17130236FDAA}" type="datetime1">
               <a:rPr lang="en-US" smtClean="0"/>
               <a:pPr/>
-              <a:t>11/2/15</a:t>
+              <a:t>11/4/15</a:t>
             </a:fld>
             <a:endParaRPr lang="en-US"/>
           </a:p>
@@ -2208,7 +2374,7 @@
             <a:fld id="{A8DD670F-7E07-4783-A6F8-B28127B5AF4A}" type="datetime1">
               <a:rPr lang="en-US" smtClean="0"/>
               <a:pPr/>
-              <a:t>11/2/15</a:t>
+              <a:t>11/4/15</a:t>
             </a:fld>
             <a:endParaRPr lang="en-US"/>
           </a:p>
@@ -2631,7 +2797,7 @@
             <a:fld id="{92676DD9-688F-48EE-8233-B3B78BDDA63D}" type="datetime1">
               <a:rPr lang="en-US" smtClean="0"/>
               <a:pPr/>
-              <a:t>11/2/15</a:t>
+              <a:t>11/4/15</a:t>
             </a:fld>
             <a:endParaRPr lang="en-US"/>
           </a:p>
@@ -2750,7 +2916,7 @@
             <a:fld id="{F6CC4A83-AE34-48B8-B90E-70388FDBF0F7}" type="datetime1">
               <a:rPr lang="en-US" smtClean="0"/>
               <a:pPr/>
-              <a:t>11/2/15</a:t>
+              <a:t>11/4/15</a:t>
             </a:fld>
             <a:endParaRPr lang="en-US"/>
           </a:p>
@@ -2846,7 +3012,7 @@
             <a:fld id="{510CA3E2-9601-488E-B92B-23013819BD02}" type="datetime1">
               <a:rPr lang="en-US" smtClean="0"/>
               <a:pPr/>
-              <a:t>11/2/15</a:t>
+              <a:t>11/4/15</a:t>
             </a:fld>
             <a:endParaRPr lang="en-US"/>
           </a:p>
@@ -3124,7 +3290,7 @@
             <a:fld id="{331F1CBD-358A-4E18-86FD-C337233E15F0}" type="datetime1">
               <a:rPr lang="en-US" smtClean="0"/>
               <a:pPr/>
-              <a:t>11/2/15</a:t>
+              <a:t>11/4/15</a:t>
             </a:fld>
             <a:endParaRPr lang="en-US"/>
           </a:p>
@@ -3378,7 +3544,7 @@
             <a:fld id="{3CB4F0D5-901F-4458-A8F8-F062616694B4}" type="datetime1">
               <a:rPr lang="en-US" smtClean="0"/>
               <a:pPr/>
-              <a:t>11/2/15</a:t>
+              <a:t>11/4/15</a:t>
             </a:fld>
             <a:endParaRPr lang="en-US"/>
           </a:p>
@@ -3592,7 +3758,7 @@
             <a:fld id="{F77D84EF-BDBF-448B-906E-D51D4CAF22DC}" type="datetime1">
               <a:rPr lang="en-US" smtClean="0"/>
               <a:pPr/>
-              <a:t>11/2/15</a:t>
+              <a:t>11/4/15</a:t>
             </a:fld>
             <a:endParaRPr lang="en-US"/>
           </a:p>
@@ -3980,13 +4146,13 @@
         </p:nvSpPr>
         <p:spPr>
           <a:xfrm>
-            <a:off x="914400" y="762000"/>
+            <a:off x="685800" y="3318"/>
             <a:ext cx="7772400" cy="2895600"/>
           </a:xfrm>
         </p:spPr>
         <p:txBody>
           <a:bodyPr>
-            <a:normAutofit fontScale="90000"/>
+            <a:normAutofit/>
           </a:bodyPr>
           <a:lstStyle/>
           <a:p>
@@ -4020,25 +4186,26 @@
               </a:rPr>
             </a:br>
             <a:r>
-              <a:rPr lang="en-US" sz="3200" dirty="0">
+              <a:rPr lang="en-US" sz="3200" dirty="0" smtClean="0">
                 <a:solidFill>
                   <a:schemeClr val="accent2">
                     <a:lumMod val="75000"/>
                   </a:schemeClr>
                 </a:solidFill>
               </a:rPr>
-              <a:t/>
-            </a:r>
-            <a:br>
-              <a:rPr lang="en-US" sz="3200" dirty="0">
+              <a:t>Bayesian Multiple </a:t>
+            </a:r>
+            <a:r>
+              <a:rPr lang="en-US" sz="3200" dirty="0" smtClean="0">
                 <a:solidFill>
                   <a:schemeClr val="accent2">
                     <a:lumMod val="75000"/>
                   </a:schemeClr>
                 </a:solidFill>
               </a:rPr>
-            </a:br>
-            <a:r>
+              <a:t>Linear Regression: </a:t>
+            </a:r>
+            <a:br>
               <a:rPr lang="en-US" sz="3200" dirty="0" smtClean="0">
                 <a:solidFill>
                   <a:schemeClr val="accent2">
@@ -4046,133 +4213,26 @@
                   </a:schemeClr>
                 </a:solidFill>
               </a:rPr>
-              <a:t>Summary of </a:t>
-            </a:r>
-            <a:r>
-              <a:rPr lang="en-US" sz="3200" dirty="0" smtClean="0">
+            </a:br>
+            <a:r>
+              <a:rPr lang="en-US" sz="3200" dirty="0">
                 <a:solidFill>
                   <a:schemeClr val="accent2">
                     <a:lumMod val="75000"/>
                   </a:schemeClr>
                 </a:solidFill>
               </a:rPr>
-              <a:t>Bayesian </a:t>
-            </a:r>
-            <a:r>
-              <a:rPr lang="en-US" sz="3200" dirty="0" smtClean="0">
+              <a:t/>
+            </a:r>
+            <a:br>
+              <a:rPr lang="en-US" sz="3200" dirty="0">
                 <a:solidFill>
                   <a:schemeClr val="accent2">
                     <a:lumMod val="75000"/>
                   </a:schemeClr>
                 </a:solidFill>
               </a:rPr>
-              <a:t>Multiple Linear </a:t>
-            </a:r>
-            <a:r>
-              <a:rPr lang="en-US" sz="3200" dirty="0" smtClean="0">
-                <a:solidFill>
-                  <a:schemeClr val="accent2">
-                    <a:lumMod val="75000"/>
-                  </a:schemeClr>
-                </a:solidFill>
-              </a:rPr>
-              <a:t>Regression: </a:t>
-            </a:r>
-            <a:br>
-              <a:rPr lang="en-US" sz="3200" dirty="0" smtClean="0">
-                <a:solidFill>
-                  <a:schemeClr val="accent2">
-                    <a:lumMod val="75000"/>
-                  </a:schemeClr>
-                </a:solidFill>
-              </a:rPr>
             </a:br>
-            <a:r>
-              <a:rPr lang="en-US" sz="3200" dirty="0">
-                <a:solidFill>
-                  <a:schemeClr val="accent2">
-                    <a:lumMod val="75000"/>
-                  </a:schemeClr>
-                </a:solidFill>
-              </a:rPr>
-              <a:t/>
-            </a:r>
-            <a:br>
-              <a:rPr lang="en-US" sz="3200" dirty="0">
-                <a:solidFill>
-                  <a:schemeClr val="accent2">
-                    <a:lumMod val="75000"/>
-                  </a:schemeClr>
-                </a:solidFill>
-              </a:rPr>
-            </a:br>
-            <a:r>
-              <a:rPr lang="en-US" sz="3200" dirty="0" smtClean="0">
-                <a:solidFill>
-                  <a:schemeClr val="accent2">
-                    <a:lumMod val="75000"/>
-                  </a:schemeClr>
-                </a:solidFill>
-              </a:rPr>
-              <a:t>- Regression equation</a:t>
-            </a:r>
-            <a:br>
-              <a:rPr lang="en-US" sz="3200" dirty="0" smtClean="0">
-                <a:solidFill>
-                  <a:schemeClr val="accent2">
-                    <a:lumMod val="75000"/>
-                  </a:schemeClr>
-                </a:solidFill>
-              </a:rPr>
-            </a:br>
-            <a:r>
-              <a:rPr lang="en-US" sz="3200" dirty="0" smtClean="0">
-                <a:solidFill>
-                  <a:schemeClr val="accent2">
-                    <a:lumMod val="75000"/>
-                  </a:schemeClr>
-                </a:solidFill>
-              </a:rPr>
-              <a:t>- Likelihood</a:t>
-            </a:r>
-            <a:br>
-              <a:rPr lang="en-US" sz="3200" dirty="0" smtClean="0">
-                <a:solidFill>
-                  <a:schemeClr val="accent2">
-                    <a:lumMod val="75000"/>
-                  </a:schemeClr>
-                </a:solidFill>
-              </a:rPr>
-            </a:br>
-            <a:r>
-              <a:rPr lang="en-US" sz="3200" dirty="0" smtClean="0">
-                <a:solidFill>
-                  <a:schemeClr val="accent2">
-                    <a:lumMod val="75000"/>
-                  </a:schemeClr>
-                </a:solidFill>
-              </a:rPr>
-              <a:t>- Prior</a:t>
-            </a:r>
-            <a:br>
-              <a:rPr lang="en-US" sz="3200" dirty="0" smtClean="0">
-                <a:solidFill>
-                  <a:schemeClr val="accent2">
-                    <a:lumMod val="75000"/>
-                  </a:schemeClr>
-                </a:solidFill>
-              </a:rPr>
-            </a:br>
-            <a:r>
-              <a:rPr lang="en-US" sz="3200" dirty="0" smtClean="0">
-                <a:solidFill>
-                  <a:schemeClr val="accent2">
-                    <a:lumMod val="75000"/>
-                  </a:schemeClr>
-                </a:solidFill>
-              </a:rPr>
-              <a:t>- Posterior distribution</a:t>
-            </a:r>
             <a:endParaRPr lang="en-US" sz="3200" dirty="0" smtClean="0">
               <a:solidFill>
                 <a:schemeClr val="accent2">
@@ -4209,6 +4269,152 @@
             <a:endParaRPr lang="en-US" dirty="0">
               <a:solidFill>
                 <a:schemeClr val="accent1"/>
+              </a:solidFill>
+            </a:endParaRPr>
+          </a:p>
+        </p:txBody>
+      </p:sp>
+      <p:sp>
+        <p:nvSpPr>
+          <p:cNvPr id="3" name="TextBox 2"/>
+          <p:cNvSpPr txBox="1"/>
+          <p:nvPr/>
+        </p:nvSpPr>
+        <p:spPr>
+          <a:xfrm>
+            <a:off x="990600" y="1981200"/>
+            <a:ext cx="7620000" cy="2677656"/>
+          </a:xfrm>
+          <a:prstGeom prst="rect">
+            <a:avLst/>
+          </a:prstGeom>
+          <a:noFill/>
+        </p:spPr>
+        <p:txBody>
+          <a:bodyPr wrap="square" rtlCol="0">
+            <a:spAutoFit/>
+          </a:bodyPr>
+          <a:lstStyle/>
+          <a:p>
+            <a:pPr marL="342900" indent="-342900">
+              <a:buFontTx/>
+              <a:buChar char="-"/>
+            </a:pPr>
+            <a:r>
+              <a:rPr lang="en-US" sz="2400" dirty="0" smtClean="0">
+                <a:solidFill>
+                  <a:schemeClr val="tx2"/>
+                </a:solidFill>
+              </a:rPr>
+              <a:t>Regression </a:t>
+            </a:r>
+            <a:r>
+              <a:rPr lang="en-US" sz="2400" dirty="0">
+                <a:solidFill>
+                  <a:schemeClr val="tx2"/>
+                </a:solidFill>
+              </a:rPr>
+              <a:t>equation</a:t>
+            </a:r>
+            <a:br>
+              <a:rPr lang="en-US" sz="2400" dirty="0">
+                <a:solidFill>
+                  <a:schemeClr val="tx2"/>
+                </a:solidFill>
+              </a:rPr>
+            </a:br>
+            <a:r>
+              <a:rPr lang="en-US" sz="2400" dirty="0">
+                <a:solidFill>
+                  <a:schemeClr val="tx2"/>
+                </a:solidFill>
+              </a:rPr>
+              <a:t>- Likelihood</a:t>
+            </a:r>
+            <a:br>
+              <a:rPr lang="en-US" sz="2400" dirty="0">
+                <a:solidFill>
+                  <a:schemeClr val="tx2"/>
+                </a:solidFill>
+              </a:rPr>
+            </a:br>
+            <a:r>
+              <a:rPr lang="en-US" sz="2400" dirty="0">
+                <a:solidFill>
+                  <a:schemeClr val="tx2"/>
+                </a:solidFill>
+              </a:rPr>
+              <a:t>- Prior</a:t>
+            </a:r>
+            <a:br>
+              <a:rPr lang="en-US" sz="2400" dirty="0">
+                <a:solidFill>
+                  <a:schemeClr val="tx2"/>
+                </a:solidFill>
+              </a:rPr>
+            </a:br>
+            <a:r>
+              <a:rPr lang="en-US" sz="2400" dirty="0">
+                <a:solidFill>
+                  <a:schemeClr val="tx2"/>
+                </a:solidFill>
+              </a:rPr>
+              <a:t>- Posterior distribution</a:t>
+            </a:r>
+            <a:br>
+              <a:rPr lang="en-US" sz="2400" dirty="0">
+                <a:solidFill>
+                  <a:schemeClr val="tx2"/>
+                </a:solidFill>
+              </a:rPr>
+            </a:br>
+            <a:r>
+              <a:rPr lang="en-US" sz="2400" dirty="0">
+                <a:solidFill>
+                  <a:schemeClr val="tx2"/>
+                </a:solidFill>
+              </a:rPr>
+              <a:t>- Outline of a </a:t>
+            </a:r>
+            <a:r>
+              <a:rPr lang="en-US" sz="2400" dirty="0" smtClean="0">
+                <a:solidFill>
+                  <a:schemeClr val="tx2"/>
+                </a:solidFill>
+              </a:rPr>
+              <a:t>Sampler</a:t>
+            </a:r>
+          </a:p>
+          <a:p>
+            <a:r>
+              <a:rPr lang="en-US" sz="2400" dirty="0">
+                <a:solidFill>
+                  <a:schemeClr val="tx2"/>
+                </a:solidFill>
+              </a:rPr>
+              <a:t> </a:t>
+            </a:r>
+            <a:r>
+              <a:rPr lang="en-US" sz="2400" dirty="0" smtClean="0">
+                <a:solidFill>
+                  <a:schemeClr val="tx2"/>
+                </a:solidFill>
+              </a:rPr>
+              <a:t>    - Gibbs sampler with unknown variances</a:t>
+            </a:r>
+          </a:p>
+          <a:p>
+            <a:r>
+              <a:rPr lang="en-US" sz="2400" dirty="0" smtClean="0">
+                <a:solidFill>
+                  <a:schemeClr val="tx2"/>
+                </a:solidFill>
+              </a:rPr>
+              <a:t>     - Gibbs sampler with single-coefficients updates.</a:t>
+            </a:r>
+            <a:endParaRPr lang="en-US" sz="2400" dirty="0">
+              <a:solidFill>
+                <a:schemeClr val="tx2"/>
               </a:solidFill>
             </a:endParaRPr>
           </a:p>
@@ -4607,45 +4813,28 @@
                   </a:schemeClr>
                 </a:solidFill>
               </a:rPr>
-              <a:t>        Probability </a:t>
-            </a:r>
-            <a:r>
-              <a:rPr lang="en-US" dirty="0" smtClean="0">
+              <a:t>        Probability assumptions (for now </a:t>
+            </a:r>
+            <a:r>
+              <a:rPr lang="en-US" dirty="0" err="1" smtClean="0">
                 <a:solidFill>
                   <a:schemeClr val="accent1">
                     <a:lumMod val="75000"/>
                   </a:schemeClr>
                 </a:solidFill>
               </a:rPr>
-              <a:t>assumptions (for now </a:t>
-            </a:r>
-            <a:r>
-              <a:rPr lang="en-US" dirty="0" err="1" smtClean="0">
+              <a:t>iid</a:t>
+            </a:r>
+            <a:r>
+              <a:rPr lang="en-US" dirty="0" smtClean="0">
                 <a:solidFill>
                   <a:schemeClr val="accent1">
                     <a:lumMod val="75000"/>
                   </a:schemeClr>
                 </a:solidFill>
               </a:rPr>
-              <a:t>iid</a:t>
-            </a:r>
-            <a:r>
-              <a:rPr lang="en-US" dirty="0" smtClean="0">
-                <a:solidFill>
-                  <a:schemeClr val="accent1">
-                    <a:lumMod val="75000"/>
-                  </a:schemeClr>
-                </a:solidFill>
-              </a:rPr>
               <a:t> errors)</a:t>
             </a:r>
-            <a:endParaRPr lang="en-US" dirty="0" smtClean="0">
-              <a:solidFill>
-                <a:schemeClr val="accent1">
-                  <a:lumMod val="75000"/>
-                </a:schemeClr>
-              </a:solidFill>
-            </a:endParaRPr>
           </a:p>
           <a:p>
             <a:endParaRPr lang="en-US" dirty="0" smtClean="0">
@@ -4745,7 +4934,7 @@
           <a:graphicData uri="http://schemas.openxmlformats.org/presentationml/2006/ole">
             <mc:AlternateContent xmlns:mc="http://schemas.openxmlformats.org/markup-compatibility/2006">
               <mc:Choice xmlns:v="urn:schemas-microsoft-com:vml" Requires="v">
-                <p:oleObj spid="_x0000_s1073" name="Equation" r:id="rId4" imgW="1092200" imgH="330200" progId="Equation.3">
+                <p:oleObj spid="_x0000_s1081" name="Equation" r:id="rId4" imgW="1092200" imgH="330200" progId="Equation.3">
                   <p:embed/>
                 </p:oleObj>
               </mc:Choice>
@@ -4802,7 +4991,7 @@
           <a:graphicData uri="http://schemas.openxmlformats.org/presentationml/2006/ole">
             <mc:AlternateContent xmlns:mc="http://schemas.openxmlformats.org/markup-compatibility/2006">
               <mc:Choice xmlns:v="urn:schemas-microsoft-com:vml" Requires="v">
-                <p:oleObj spid="_x0000_s1074" name="Equation" r:id="rId6" imgW="1295400" imgH="266700" progId="Equation.3">
+                <p:oleObj spid="_x0000_s1082" name="Equation" r:id="rId6" imgW="1295400" imgH="266700" progId="Equation.3">
                   <p:embed/>
                 </p:oleObj>
               </mc:Choice>
@@ -4859,7 +5048,7 @@
           <a:graphicData uri="http://schemas.openxmlformats.org/presentationml/2006/ole">
             <mc:AlternateContent xmlns:mc="http://schemas.openxmlformats.org/markup-compatibility/2006">
               <mc:Choice xmlns:v="urn:schemas-microsoft-com:vml" Requires="v">
-                <p:oleObj spid="_x0000_s1075" name="Equation" r:id="rId8" imgW="1308100" imgH="342900" progId="Equation.3">
+                <p:oleObj spid="_x0000_s1083" name="Equation" r:id="rId8" imgW="1308100" imgH="342900" progId="Equation.3">
                   <p:embed/>
                 </p:oleObj>
               </mc:Choice>
@@ -4916,7 +5105,7 @@
           <a:graphicData uri="http://schemas.openxmlformats.org/presentationml/2006/ole">
             <mc:AlternateContent xmlns:mc="http://schemas.openxmlformats.org/markup-compatibility/2006">
               <mc:Choice xmlns:v="urn:schemas-microsoft-com:vml" Requires="v">
-                <p:oleObj spid="_x0000_s1076" name="Equation" r:id="rId10" imgW="723900" imgH="215900" progId="Equation.3">
+                <p:oleObj spid="_x0000_s1084" name="Equation" r:id="rId10" imgW="723900" imgH="215900" progId="Equation.3">
                   <p:embed/>
                 </p:oleObj>
               </mc:Choice>
@@ -4973,7 +5162,7 @@
           <a:graphicData uri="http://schemas.openxmlformats.org/presentationml/2006/ole">
             <mc:AlternateContent xmlns:mc="http://schemas.openxmlformats.org/markup-compatibility/2006">
               <mc:Choice xmlns:v="urn:schemas-microsoft-com:vml" Requires="v">
-                <p:oleObj spid="_x0000_s1077" name="Equation" r:id="rId12" imgW="673100" imgH="203200" progId="Equation.3">
+                <p:oleObj spid="_x0000_s1085" name="Equation" r:id="rId12" imgW="673100" imgH="203200" progId="Equation.3">
                   <p:embed/>
                 </p:oleObj>
               </mc:Choice>
@@ -5030,7 +5219,7 @@
           <a:graphicData uri="http://schemas.openxmlformats.org/presentationml/2006/ole">
             <mc:AlternateContent xmlns:mc="http://schemas.openxmlformats.org/markup-compatibility/2006">
               <mc:Choice xmlns:v="urn:schemas-microsoft-com:vml" Requires="v">
-                <p:oleObj spid="_x0000_s1078" name="Equation" r:id="rId14" imgW="1371600" imgH="241300" progId="Equation.3">
+                <p:oleObj spid="_x0000_s1086" name="Equation" r:id="rId14" imgW="1371600" imgH="241300" progId="Equation.3">
                   <p:embed/>
                 </p:oleObj>
               </mc:Choice>
@@ -5087,7 +5276,7 @@
           <a:graphicData uri="http://schemas.openxmlformats.org/presentationml/2006/ole">
             <mc:AlternateContent xmlns:mc="http://schemas.openxmlformats.org/markup-compatibility/2006">
               <mc:Choice xmlns:v="urn:schemas-microsoft-com:vml" Requires="v">
-                <p:oleObj spid="_x0000_s1079" name="Equation" r:id="rId16" imgW="1054100" imgH="342900" progId="Equation.3">
+                <p:oleObj spid="_x0000_s1087" name="Equation" r:id="rId16" imgW="1054100" imgH="342900" progId="Equation.3">
                   <p:embed/>
                 </p:oleObj>
               </mc:Choice>
@@ -5486,7 +5675,7 @@
           <a:graphicData uri="http://schemas.openxmlformats.org/presentationml/2006/ole">
             <mc:AlternateContent xmlns:mc="http://schemas.openxmlformats.org/markup-compatibility/2006">
               <mc:Choice xmlns:v="urn:schemas-microsoft-com:vml" Requires="v">
-                <p:oleObj spid="_x0000_s29720" name="Equation" r:id="rId4" imgW="3937000" imgH="673100" progId="Equation.3">
+                <p:oleObj spid="_x0000_s29723" name="Equation" r:id="rId4" imgW="3937000" imgH="673100" progId="Equation.3">
                   <p:embed/>
                 </p:oleObj>
               </mc:Choice>
@@ -5581,7 +5770,7 @@
           <a:graphicData uri="http://schemas.openxmlformats.org/presentationml/2006/ole">
             <mc:AlternateContent xmlns:mc="http://schemas.openxmlformats.org/markup-compatibility/2006">
               <mc:Choice xmlns:v="urn:schemas-microsoft-com:vml" Requires="v">
-                <p:oleObj spid="_x0000_s29721" name="Equation" r:id="rId6" imgW="1104900" imgH="279400" progId="Equation.3">
+                <p:oleObj spid="_x0000_s29724" name="Equation" r:id="rId6" imgW="1104900" imgH="279400" progId="Equation.3">
                   <p:embed/>
                 </p:oleObj>
               </mc:Choice>
@@ -5987,7 +6176,7 @@
           <a:graphicData uri="http://schemas.openxmlformats.org/presentationml/2006/ole">
             <mc:AlternateContent xmlns:mc="http://schemas.openxmlformats.org/markup-compatibility/2006">
               <mc:Choice xmlns:v="urn:schemas-microsoft-com:vml" Requires="v">
-                <p:oleObj spid="_x0000_s28692" name="Equation" r:id="rId4" imgW="3683000" imgH="609600" progId="Equation.3">
+                <p:oleObj spid="_x0000_s28695" name="Equation" r:id="rId4" imgW="3683000" imgH="609600" progId="Equation.3">
                   <p:embed/>
                 </p:oleObj>
               </mc:Choice>
@@ -6044,7 +6233,7 @@
           <a:graphicData uri="http://schemas.openxmlformats.org/presentationml/2006/ole">
             <mc:AlternateContent xmlns:mc="http://schemas.openxmlformats.org/markup-compatibility/2006">
               <mc:Choice xmlns:v="urn:schemas-microsoft-com:vml" Requires="v">
-                <p:oleObj spid="_x0000_s28693" name="Equation" r:id="rId6" imgW="2844800" imgH="698500" progId="Equation.3">
+                <p:oleObj spid="_x0000_s28696" name="Equation" r:id="rId6" imgW="2844800" imgH="698500" progId="Equation.3">
                   <p:embed/>
                 </p:oleObj>
               </mc:Choice>
@@ -6352,17 +6541,7 @@
                   </a:schemeClr>
                 </a:solidFill>
               </a:rPr>
-              <a:t>General for of the posterior density (</a:t>
-            </a:r>
-            <a:r>
-              <a:rPr lang="en-US" b="1" u="sng" dirty="0" smtClean="0">
-                <a:solidFill>
-                  <a:schemeClr val="accent1">
-                    <a:lumMod val="75000"/>
-                  </a:schemeClr>
-                </a:solidFill>
-              </a:rPr>
-              <a:t>derivation presented in class)</a:t>
+              <a:t>General for of the posterior density (derivation presented in class)</a:t>
             </a:r>
             <a:endParaRPr lang="en-US" b="1" u="sng" dirty="0">
               <a:solidFill>
@@ -6486,7 +6665,7 @@
           <a:graphicData uri="http://schemas.openxmlformats.org/presentationml/2006/ole">
             <mc:AlternateContent xmlns:mc="http://schemas.openxmlformats.org/markup-compatibility/2006">
               <mc:Choice xmlns:v="urn:schemas-microsoft-com:vml" Requires="v">
-                <p:oleObj spid="_x0000_s30742" name="Equation" r:id="rId4" imgW="1562100" imgH="482600" progId="Equation.3">
+                <p:oleObj spid="_x0000_s30748" name="Equation" r:id="rId4" imgW="1562100" imgH="482600" progId="Equation.3">
                   <p:embed/>
                 </p:oleObj>
               </mc:Choice>
@@ -6543,7 +6722,7 @@
           <a:graphicData uri="http://schemas.openxmlformats.org/presentationml/2006/ole">
             <mc:AlternateContent xmlns:mc="http://schemas.openxmlformats.org/markup-compatibility/2006">
               <mc:Choice xmlns:v="urn:schemas-microsoft-com:vml" Requires="v">
-                <p:oleObj spid="_x0000_s30743" name="Equation" r:id="rId6" imgW="4000500" imgH="622300" progId="Equation.3">
+                <p:oleObj spid="_x0000_s30749" name="Equation" r:id="rId6" imgW="4000500" imgH="622300" progId="Equation.3">
                   <p:embed/>
                 </p:oleObj>
               </mc:Choice>
@@ -6600,7 +6779,7 @@
           <a:graphicData uri="http://schemas.openxmlformats.org/presentationml/2006/ole">
             <mc:AlternateContent xmlns:mc="http://schemas.openxmlformats.org/markup-compatibility/2006">
               <mc:Choice xmlns:v="urn:schemas-microsoft-com:vml" Requires="v">
-                <p:oleObj spid="_x0000_s30744" name="Equation" r:id="rId8" imgW="3378200" imgH="622300" progId="Equation.3">
+                <p:oleObj spid="_x0000_s30750" name="Equation" r:id="rId8" imgW="3378200" imgH="622300" progId="Equation.3">
                   <p:embed/>
                 </p:oleObj>
               </mc:Choice>
@@ -6657,7 +6836,7 @@
           <a:graphicData uri="http://schemas.openxmlformats.org/presentationml/2006/ole">
             <mc:AlternateContent xmlns:mc="http://schemas.openxmlformats.org/markup-compatibility/2006">
               <mc:Choice xmlns:v="urn:schemas-microsoft-com:vml" Requires="v">
-                <p:oleObj spid="_x0000_s30745" name="Equation" r:id="rId10" imgW="1244600" imgH="736600" progId="Equation.3">
+                <p:oleObj spid="_x0000_s30751" name="Equation" r:id="rId10" imgW="1244600" imgH="736600" progId="Equation.3">
                   <p:embed/>
                 </p:oleObj>
               </mc:Choice>
@@ -6714,7 +6893,7 @@
           <a:graphicData uri="http://schemas.openxmlformats.org/presentationml/2006/ole">
             <mc:AlternateContent xmlns:mc="http://schemas.openxmlformats.org/markup-compatibility/2006">
               <mc:Choice xmlns:v="urn:schemas-microsoft-com:vml" Requires="v">
-                <p:oleObj spid="_x0000_s30746" name="Equation" r:id="rId12" imgW="2006600" imgH="482600" progId="Equation.3">
+                <p:oleObj spid="_x0000_s30752" name="Equation" r:id="rId12" imgW="2006600" imgH="482600" progId="Equation.3">
                   <p:embed/>
                 </p:oleObj>
               </mc:Choice>
@@ -7137,7 +7316,7 @@
           <a:graphicData uri="http://schemas.openxmlformats.org/presentationml/2006/ole">
             <mc:AlternateContent xmlns:mc="http://schemas.openxmlformats.org/markup-compatibility/2006">
               <mc:Choice xmlns:v="urn:schemas-microsoft-com:vml" Requires="v">
-                <p:oleObj spid="_x0000_s31766" name="Equation" r:id="rId4" imgW="1562100" imgH="482600" progId="Equation.3">
+                <p:oleObj spid="_x0000_s31772" name="Equation" r:id="rId4" imgW="1562100" imgH="482600" progId="Equation.3">
                   <p:embed/>
                 </p:oleObj>
               </mc:Choice>
@@ -7194,7 +7373,7 @@
           <a:graphicData uri="http://schemas.openxmlformats.org/presentationml/2006/ole">
             <mc:AlternateContent xmlns:mc="http://schemas.openxmlformats.org/markup-compatibility/2006">
               <mc:Choice xmlns:v="urn:schemas-microsoft-com:vml" Requires="v">
-                <p:oleObj spid="_x0000_s31767" name="Equation" r:id="rId6" imgW="901700" imgH="292100" progId="Equation.3">
+                <p:oleObj spid="_x0000_s31773" name="Equation" r:id="rId6" imgW="901700" imgH="292100" progId="Equation.3">
                   <p:embed/>
                 </p:oleObj>
               </mc:Choice>
@@ -7251,7 +7430,7 @@
           <a:graphicData uri="http://schemas.openxmlformats.org/presentationml/2006/ole">
             <mc:AlternateContent xmlns:mc="http://schemas.openxmlformats.org/markup-compatibility/2006">
               <mc:Choice xmlns:v="urn:schemas-microsoft-com:vml" Requires="v">
-                <p:oleObj spid="_x0000_s31768" name="Equation" r:id="rId8" imgW="1206500" imgH="736600" progId="Equation.3">
+                <p:oleObj spid="_x0000_s31774" name="Equation" r:id="rId8" imgW="1206500" imgH="736600" progId="Equation.3">
                   <p:embed/>
                 </p:oleObj>
               </mc:Choice>
@@ -7308,7 +7487,7 @@
           <a:graphicData uri="http://schemas.openxmlformats.org/presentationml/2006/ole">
             <mc:AlternateContent xmlns:mc="http://schemas.openxmlformats.org/markup-compatibility/2006">
               <mc:Choice xmlns:v="urn:schemas-microsoft-com:vml" Requires="v">
-                <p:oleObj spid="_x0000_s31769" name="Equation" r:id="rId10" imgW="1447800" imgH="431800" progId="Equation.3">
+                <p:oleObj spid="_x0000_s31775" name="Equation" r:id="rId10" imgW="1447800" imgH="431800" progId="Equation.3">
                   <p:embed/>
                 </p:oleObj>
               </mc:Choice>
@@ -7365,7 +7544,7 @@
           <a:graphicData uri="http://schemas.openxmlformats.org/presentationml/2006/ole">
             <mc:AlternateContent xmlns:mc="http://schemas.openxmlformats.org/markup-compatibility/2006">
               <mc:Choice xmlns:v="urn:schemas-microsoft-com:vml" Requires="v">
-                <p:oleObj spid="_x0000_s31770" name="Equation" r:id="rId12" imgW="1993900" imgH="431800" progId="Equation.3">
+                <p:oleObj spid="_x0000_s31776" name="Equation" r:id="rId12" imgW="1993900" imgH="431800" progId="Equation.3">
                   <p:embed/>
                 </p:oleObj>
               </mc:Choice>
@@ -7534,6 +7713,1203 @@
     <p:bldLst>
       <p:bldP spid="3" grpId="0"/>
     </p:bldLst>
+  </p:timing>
+</p:sld>
+</file>
+
+<file path=ppt/slides/slide7.xml><?xml version="1.0" encoding="utf-8"?>
+<p:sld xmlns:a="http://schemas.openxmlformats.org/drawingml/2006/main" xmlns:r="http://schemas.openxmlformats.org/officeDocument/2006/relationships" xmlns:p="http://schemas.openxmlformats.org/presentationml/2006/main">
+  <p:cSld>
+    <p:spTree>
+      <p:nvGrpSpPr>
+        <p:cNvPr id="1" name=""/>
+        <p:cNvGrpSpPr/>
+        <p:nvPr/>
+      </p:nvGrpSpPr>
+      <p:grpSpPr>
+        <a:xfrm>
+          <a:off x="0" y="0"/>
+          <a:ext cx="0" cy="0"/>
+          <a:chOff x="0" y="0"/>
+          <a:chExt cx="0" cy="0"/>
+        </a:xfrm>
+      </p:grpSpPr>
+      <p:sp>
+        <p:nvSpPr>
+          <p:cNvPr id="2" name="Title 1"/>
+          <p:cNvSpPr>
+            <a:spLocks noGrp="1"/>
+          </p:cNvSpPr>
+          <p:nvPr>
+            <p:ph type="ctrTitle"/>
+          </p:nvPr>
+        </p:nvSpPr>
+        <p:spPr>
+          <a:xfrm>
+            <a:off x="609600" y="-152400"/>
+            <a:ext cx="7772400" cy="762000"/>
+          </a:xfrm>
+        </p:spPr>
+        <p:txBody>
+          <a:bodyPr>
+            <a:normAutofit/>
+          </a:bodyPr>
+          <a:lstStyle/>
+          <a:p>
+            <a:r>
+              <a:rPr lang="en-US" sz="3200" dirty="0" smtClean="0">
+                <a:solidFill>
+                  <a:schemeClr val="accent2">
+                    <a:lumMod val="75000"/>
+                  </a:schemeClr>
+                </a:solidFill>
+              </a:rPr>
+              <a:t>Outline of a Sampler</a:t>
+            </a:r>
+            <a:endParaRPr lang="en-US" sz="3200" dirty="0">
+              <a:solidFill>
+                <a:schemeClr val="accent2">
+                  <a:lumMod val="75000"/>
+                </a:schemeClr>
+              </a:solidFill>
+            </a:endParaRPr>
+          </a:p>
+        </p:txBody>
+      </p:sp>
+      <p:sp>
+        <p:nvSpPr>
+          <p:cNvPr id="4" name="Footer Placeholder 3"/>
+          <p:cNvSpPr>
+            <a:spLocks noGrp="1"/>
+          </p:cNvSpPr>
+          <p:nvPr>
+            <p:ph type="ftr" sz="quarter" idx="11"/>
+          </p:nvPr>
+        </p:nvSpPr>
+        <p:spPr>
+          <a:xfrm>
+            <a:off x="3124200" y="6569075"/>
+            <a:ext cx="2895600" cy="365125"/>
+          </a:xfrm>
+        </p:spPr>
+        <p:txBody>
+          <a:bodyPr/>
+          <a:lstStyle/>
+          <a:p>
+            <a:r>
+              <a:rPr lang="en-US" dirty="0" smtClean="0">
+                <a:solidFill>
+                  <a:schemeClr val="accent1"/>
+                </a:solidFill>
+              </a:rPr>
+              <a:t>STT 465, MSU, Fall, 2015</a:t>
+            </a:r>
+            <a:endParaRPr lang="en-US" dirty="0">
+              <a:solidFill>
+                <a:schemeClr val="accent1"/>
+              </a:solidFill>
+            </a:endParaRPr>
+          </a:p>
+        </p:txBody>
+      </p:sp>
+      <p:sp>
+        <p:nvSpPr>
+          <p:cNvPr id="6" name="TextBox 5"/>
+          <p:cNvSpPr txBox="1"/>
+          <p:nvPr/>
+        </p:nvSpPr>
+        <p:spPr>
+          <a:xfrm>
+            <a:off x="381000" y="605908"/>
+            <a:ext cx="8077200" cy="6247865"/>
+          </a:xfrm>
+          <a:prstGeom prst="rect">
+            <a:avLst/>
+          </a:prstGeom>
+          <a:noFill/>
+          <a:ln>
+            <a:solidFill>
+              <a:srgbClr val="800000"/>
+            </a:solidFill>
+            <a:prstDash val="sysDash"/>
+          </a:ln>
+        </p:spPr>
+        <p:txBody>
+          <a:bodyPr wrap="square" rtlCol="0">
+            <a:spAutoFit/>
+          </a:bodyPr>
+          <a:lstStyle/>
+          <a:p>
+            <a:r>
+              <a:rPr lang="en-US" sz="2000" b="1" u="sng" dirty="0" smtClean="0">
+                <a:solidFill>
+                  <a:schemeClr val="accent1">
+                    <a:lumMod val="75000"/>
+                  </a:schemeClr>
+                </a:solidFill>
+              </a:rPr>
+              <a:t>Target distribution</a:t>
+            </a:r>
+            <a:endParaRPr lang="en-US" sz="2000" b="1" u="sng" dirty="0">
+              <a:solidFill>
+                <a:schemeClr val="accent1">
+                  <a:lumMod val="75000"/>
+                </a:schemeClr>
+              </a:solidFill>
+            </a:endParaRPr>
+          </a:p>
+          <a:p>
+            <a:endParaRPr lang="en-US" dirty="0">
+              <a:solidFill>
+                <a:schemeClr val="accent1">
+                  <a:lumMod val="75000"/>
+                </a:schemeClr>
+              </a:solidFill>
+            </a:endParaRPr>
+          </a:p>
+          <a:p>
+            <a:endParaRPr lang="en-US" dirty="0" smtClean="0">
+              <a:solidFill>
+                <a:schemeClr val="accent1">
+                  <a:lumMod val="75000"/>
+                </a:schemeClr>
+              </a:solidFill>
+            </a:endParaRPr>
+          </a:p>
+          <a:p>
+            <a:endParaRPr lang="en-US" dirty="0">
+              <a:solidFill>
+                <a:schemeClr val="accent1">
+                  <a:lumMod val="75000"/>
+                </a:schemeClr>
+              </a:solidFill>
+            </a:endParaRPr>
+          </a:p>
+          <a:p>
+            <a:endParaRPr lang="en-US" sz="2000" b="1" u="sng" dirty="0">
+              <a:solidFill>
+                <a:schemeClr val="accent1">
+                  <a:lumMod val="75000"/>
+                </a:schemeClr>
+              </a:solidFill>
+            </a:endParaRPr>
+          </a:p>
+          <a:p>
+            <a:endParaRPr lang="en-US" dirty="0" smtClean="0">
+              <a:solidFill>
+                <a:schemeClr val="accent1">
+                  <a:lumMod val="75000"/>
+                </a:schemeClr>
+              </a:solidFill>
+            </a:endParaRPr>
+          </a:p>
+          <a:p>
+            <a:endParaRPr lang="en-US" dirty="0">
+              <a:solidFill>
+                <a:schemeClr val="accent1">
+                  <a:lumMod val="75000"/>
+                </a:schemeClr>
+              </a:solidFill>
+            </a:endParaRPr>
+          </a:p>
+          <a:p>
+            <a:r>
+              <a:rPr lang="en-US" dirty="0" smtClean="0">
+                <a:solidFill>
+                  <a:schemeClr val="accent1">
+                    <a:lumMod val="75000"/>
+                  </a:schemeClr>
+                </a:solidFill>
+              </a:rPr>
+              <a:t>   </a:t>
+            </a:r>
+          </a:p>
+          <a:p>
+            <a:endParaRPr lang="en-US" dirty="0" smtClean="0">
+              <a:solidFill>
+                <a:schemeClr val="accent1">
+                  <a:lumMod val="75000"/>
+                </a:schemeClr>
+              </a:solidFill>
+            </a:endParaRPr>
+          </a:p>
+          <a:p>
+            <a:r>
+              <a:rPr lang="en-US" b="1" u="sng" dirty="0" smtClean="0">
+                <a:solidFill>
+                  <a:schemeClr val="accent1">
+                    <a:lumMod val="75000"/>
+                  </a:schemeClr>
+                </a:solidFill>
+              </a:rPr>
+              <a:t>Outline of a sampler</a:t>
+            </a:r>
+            <a:endParaRPr lang="en-US" dirty="0" smtClean="0">
+              <a:solidFill>
+                <a:schemeClr val="accent1">
+                  <a:lumMod val="75000"/>
+                </a:schemeClr>
+              </a:solidFill>
+            </a:endParaRPr>
+          </a:p>
+          <a:p>
+            <a:r>
+              <a:rPr lang="en-US" dirty="0" smtClean="0">
+                <a:solidFill>
+                  <a:schemeClr val="accent1">
+                    <a:lumMod val="75000"/>
+                  </a:schemeClr>
+                </a:solidFill>
+              </a:rPr>
+              <a:t>  </a:t>
+            </a:r>
+            <a:endParaRPr lang="en-US" dirty="0">
+              <a:solidFill>
+                <a:schemeClr val="accent1">
+                  <a:lumMod val="75000"/>
+                </a:schemeClr>
+              </a:solidFill>
+            </a:endParaRPr>
+          </a:p>
+          <a:p>
+            <a:r>
+              <a:rPr lang="en-US" dirty="0" smtClean="0">
+                <a:solidFill>
+                  <a:schemeClr val="accent1">
+                    <a:lumMod val="75000"/>
+                  </a:schemeClr>
+                </a:solidFill>
+              </a:rPr>
+              <a:t>     - Compute C and it’s inverse</a:t>
+            </a:r>
+          </a:p>
+          <a:p>
+            <a:r>
+              <a:rPr lang="en-US" dirty="0">
+                <a:solidFill>
+                  <a:schemeClr val="accent1">
+                    <a:lumMod val="75000"/>
+                  </a:schemeClr>
+                </a:solidFill>
+              </a:rPr>
+              <a:t> </a:t>
+            </a:r>
+            <a:r>
+              <a:rPr lang="en-US" dirty="0" smtClean="0">
+                <a:solidFill>
+                  <a:schemeClr val="accent1">
+                    <a:lumMod val="75000"/>
+                  </a:schemeClr>
+                </a:solidFill>
+              </a:rPr>
+              <a:t>    - Compute </a:t>
+            </a:r>
+            <a:r>
+              <a:rPr lang="en-US" dirty="0" err="1" smtClean="0">
+                <a:solidFill>
+                  <a:schemeClr val="accent1">
+                    <a:lumMod val="75000"/>
+                  </a:schemeClr>
+                </a:solidFill>
+              </a:rPr>
+              <a:t>rhs</a:t>
+            </a:r>
+            <a:endParaRPr lang="en-US" dirty="0" smtClean="0">
+              <a:solidFill>
+                <a:schemeClr val="accent1">
+                  <a:lumMod val="75000"/>
+                </a:schemeClr>
+              </a:solidFill>
+            </a:endParaRPr>
+          </a:p>
+          <a:p>
+            <a:r>
+              <a:rPr lang="en-US" dirty="0">
+                <a:solidFill>
+                  <a:schemeClr val="accent1">
+                    <a:lumMod val="75000"/>
+                  </a:schemeClr>
+                </a:solidFill>
+              </a:rPr>
+              <a:t> </a:t>
+            </a:r>
+            <a:r>
+              <a:rPr lang="en-US" dirty="0" smtClean="0">
+                <a:solidFill>
+                  <a:schemeClr val="accent1">
+                    <a:lumMod val="75000"/>
+                  </a:schemeClr>
+                </a:solidFill>
+              </a:rPr>
+              <a:t>    - Compute the posterior mean</a:t>
+            </a:r>
+          </a:p>
+          <a:p>
+            <a:r>
+              <a:rPr lang="en-US" dirty="0">
+                <a:solidFill>
+                  <a:schemeClr val="accent1">
+                    <a:lumMod val="75000"/>
+                  </a:schemeClr>
+                </a:solidFill>
+              </a:rPr>
+              <a:t> </a:t>
+            </a:r>
+            <a:r>
+              <a:rPr lang="en-US" dirty="0" smtClean="0">
+                <a:solidFill>
+                  <a:schemeClr val="accent1">
+                    <a:lumMod val="75000"/>
+                  </a:schemeClr>
+                </a:solidFill>
+              </a:rPr>
+              <a:t>    - To sample from MVN</a:t>
+            </a:r>
+          </a:p>
+          <a:p>
+            <a:r>
+              <a:rPr lang="en-US" dirty="0">
+                <a:solidFill>
+                  <a:schemeClr val="accent1">
+                    <a:lumMod val="75000"/>
+                  </a:schemeClr>
+                </a:solidFill>
+              </a:rPr>
+              <a:t> </a:t>
+            </a:r>
+            <a:r>
+              <a:rPr lang="en-US" dirty="0" smtClean="0">
+                <a:solidFill>
+                  <a:schemeClr val="accent1">
+                    <a:lumMod val="75000"/>
+                  </a:schemeClr>
+                </a:solidFill>
+              </a:rPr>
+              <a:t>                    - draw </a:t>
+            </a:r>
+            <a:r>
+              <a:rPr lang="en-US" dirty="0" err="1" smtClean="0">
+                <a:solidFill>
+                  <a:schemeClr val="accent1">
+                    <a:lumMod val="75000"/>
+                  </a:schemeClr>
+                </a:solidFill>
+              </a:rPr>
+              <a:t>iid</a:t>
+            </a:r>
+            <a:r>
+              <a:rPr lang="en-US" dirty="0">
+                <a:solidFill>
+                  <a:schemeClr val="accent1">
+                    <a:lumMod val="75000"/>
+                  </a:schemeClr>
+                </a:solidFill>
+              </a:rPr>
+              <a:t> </a:t>
+            </a:r>
+            <a:r>
+              <a:rPr lang="en-US" dirty="0" smtClean="0">
+                <a:solidFill>
+                  <a:schemeClr val="accent1">
+                    <a:lumMod val="75000"/>
+                  </a:schemeClr>
+                </a:solidFill>
+              </a:rPr>
+              <a:t>standard normal</a:t>
+            </a:r>
+          </a:p>
+          <a:p>
+            <a:r>
+              <a:rPr lang="en-US" dirty="0">
+                <a:solidFill>
+                  <a:schemeClr val="accent1">
+                    <a:lumMod val="75000"/>
+                  </a:schemeClr>
+                </a:solidFill>
+              </a:rPr>
+              <a:t> </a:t>
+            </a:r>
+            <a:r>
+              <a:rPr lang="en-US" dirty="0" smtClean="0">
+                <a:solidFill>
+                  <a:schemeClr val="accent1">
+                    <a:lumMod val="75000"/>
+                  </a:schemeClr>
+                </a:solidFill>
+              </a:rPr>
+              <a:t>                    - pre-multiply the </a:t>
+            </a:r>
+            <a:r>
+              <a:rPr lang="en-US" dirty="0" err="1" smtClean="0">
+                <a:solidFill>
+                  <a:schemeClr val="accent1">
+                    <a:lumMod val="75000"/>
+                  </a:schemeClr>
+                </a:solidFill>
+              </a:rPr>
+              <a:t>iid</a:t>
+            </a:r>
+            <a:r>
+              <a:rPr lang="en-US" dirty="0" smtClean="0">
+                <a:solidFill>
+                  <a:schemeClr val="accent1">
+                    <a:lumMod val="75000"/>
+                  </a:schemeClr>
+                </a:solidFill>
+              </a:rPr>
+              <a:t> standard normal with the (upper-triangular) </a:t>
+            </a:r>
+          </a:p>
+          <a:p>
+            <a:r>
+              <a:rPr lang="en-US" dirty="0">
+                <a:solidFill>
+                  <a:schemeClr val="accent1">
+                    <a:lumMod val="75000"/>
+                  </a:schemeClr>
+                </a:solidFill>
+              </a:rPr>
+              <a:t> </a:t>
+            </a:r>
+            <a:r>
+              <a:rPr lang="en-US" dirty="0" smtClean="0">
+                <a:solidFill>
+                  <a:schemeClr val="accent1">
+                    <a:lumMod val="75000"/>
+                  </a:schemeClr>
+                </a:solidFill>
+              </a:rPr>
+              <a:t>                        </a:t>
+            </a:r>
+            <a:r>
+              <a:rPr lang="en-US" dirty="0" err="1" smtClean="0">
+                <a:solidFill>
+                  <a:schemeClr val="accent1">
+                    <a:lumMod val="75000"/>
+                  </a:schemeClr>
+                </a:solidFill>
+              </a:rPr>
+              <a:t>Cholesky</a:t>
+            </a:r>
+            <a:r>
+              <a:rPr lang="en-US" dirty="0" smtClean="0">
+                <a:solidFill>
+                  <a:schemeClr val="accent1">
+                    <a:lumMod val="75000"/>
+                  </a:schemeClr>
+                </a:solidFill>
+              </a:rPr>
+              <a:t>  of the inverse of C.</a:t>
+            </a:r>
+          </a:p>
+          <a:p>
+            <a:r>
+              <a:rPr lang="en-US" dirty="0">
+                <a:solidFill>
+                  <a:schemeClr val="accent1">
+                    <a:lumMod val="75000"/>
+                  </a:schemeClr>
+                </a:solidFill>
+              </a:rPr>
+              <a:t> </a:t>
+            </a:r>
+            <a:r>
+              <a:rPr lang="en-US" dirty="0" smtClean="0">
+                <a:solidFill>
+                  <a:schemeClr val="accent1">
+                    <a:lumMod val="75000"/>
+                  </a:schemeClr>
+                </a:solidFill>
+              </a:rPr>
+              <a:t>                     - add the solution.</a:t>
+            </a:r>
+          </a:p>
+          <a:p>
+            <a:endParaRPr lang="en-US" dirty="0">
+              <a:solidFill>
+                <a:schemeClr val="accent1">
+                  <a:lumMod val="75000"/>
+                </a:schemeClr>
+              </a:solidFill>
+            </a:endParaRPr>
+          </a:p>
+          <a:p>
+            <a:endParaRPr lang="en-US" dirty="0">
+              <a:solidFill>
+                <a:schemeClr val="accent1">
+                  <a:lumMod val="75000"/>
+                </a:schemeClr>
+              </a:solidFill>
+            </a:endParaRPr>
+          </a:p>
+          <a:p>
+            <a:endParaRPr lang="en-US" dirty="0">
+              <a:solidFill>
+                <a:schemeClr val="accent1">
+                  <a:lumMod val="75000"/>
+                </a:schemeClr>
+              </a:solidFill>
+            </a:endParaRPr>
+          </a:p>
+        </p:txBody>
+      </p:sp>
+      <p:graphicFrame>
+        <p:nvGraphicFramePr>
+          <p:cNvPr id="19" name="Object 18"/>
+          <p:cNvGraphicFramePr>
+            <a:graphicFrameLocks noChangeAspect="1"/>
+          </p:cNvGraphicFramePr>
+          <p:nvPr>
+            <p:extLst>
+              <p:ext uri="{D42A27DB-BD31-4B8C-83A1-F6EECF244321}">
+                <p14:modId xmlns:p14="http://schemas.microsoft.com/office/powerpoint/2010/main" val="4279486260"/>
+              </p:ext>
+            </p:extLst>
+          </p:nvPr>
+        </p:nvGraphicFramePr>
+        <p:xfrm>
+          <a:off x="2209800" y="1143000"/>
+          <a:ext cx="3354387" cy="1036638"/>
+        </p:xfrm>
+        <a:graphic>
+          <a:graphicData uri="http://schemas.openxmlformats.org/presentationml/2006/ole">
+            <mc:AlternateContent xmlns:mc="http://schemas.openxmlformats.org/markup-compatibility/2006">
+              <mc:Choice xmlns:v="urn:schemas-microsoft-com:vml" Requires="v">
+                <p:oleObj spid="_x0000_s33793" name="Equation" r:id="rId4" imgW="1562100" imgH="482600" progId="Equation.3">
+                  <p:embed/>
+                </p:oleObj>
+              </mc:Choice>
+              <mc:Fallback>
+                <p:oleObj name="Equation" r:id="rId4" imgW="1562100" imgH="482600" progId="Equation.3">
+                  <p:embed/>
+                  <p:pic>
+                    <p:nvPicPr>
+                      <p:cNvPr id="0" name=""/>
+                      <p:cNvPicPr/>
+                      <p:nvPr/>
+                    </p:nvPicPr>
+                    <p:blipFill>
+                      <a:blip r:embed="rId5"/>
+                      <a:stretch>
+                        <a:fillRect/>
+                      </a:stretch>
+                    </p:blipFill>
+                    <p:spPr>
+                      <a:xfrm>
+                        <a:off x="2209800" y="1143000"/>
+                        <a:ext cx="3354387" cy="1036638"/>
+                      </a:xfrm>
+                      <a:prstGeom prst="rect">
+                        <a:avLst/>
+                      </a:prstGeom>
+                    </p:spPr>
+                  </p:pic>
+                </p:oleObj>
+              </mc:Fallback>
+            </mc:AlternateContent>
+          </a:graphicData>
+        </a:graphic>
+      </p:graphicFrame>
+      <p:graphicFrame>
+        <p:nvGraphicFramePr>
+          <p:cNvPr id="10" name="Object 9"/>
+          <p:cNvGraphicFramePr>
+            <a:graphicFrameLocks noChangeAspect="1"/>
+          </p:cNvGraphicFramePr>
+          <p:nvPr>
+            <p:extLst>
+              <p:ext uri="{D42A27DB-BD31-4B8C-83A1-F6EECF244321}">
+                <p14:modId xmlns:p14="http://schemas.microsoft.com/office/powerpoint/2010/main" val="2596377628"/>
+              </p:ext>
+            </p:extLst>
+          </p:nvPr>
+        </p:nvGraphicFramePr>
+        <p:xfrm>
+          <a:off x="2895600" y="1752600"/>
+          <a:ext cx="2590800" cy="1582738"/>
+        </p:xfrm>
+        <a:graphic>
+          <a:graphicData uri="http://schemas.openxmlformats.org/presentationml/2006/ole">
+            <mc:AlternateContent xmlns:mc="http://schemas.openxmlformats.org/markup-compatibility/2006">
+              <mc:Choice xmlns:v="urn:schemas-microsoft-com:vml" Requires="v">
+                <p:oleObj spid="_x0000_s33794" name="Equation" r:id="rId6" imgW="1206500" imgH="736600" progId="Equation.3">
+                  <p:embed/>
+                </p:oleObj>
+              </mc:Choice>
+              <mc:Fallback>
+                <p:oleObj name="Equation" r:id="rId6" imgW="1206500" imgH="736600" progId="Equation.3">
+                  <p:embed/>
+                  <p:pic>
+                    <p:nvPicPr>
+                      <p:cNvPr id="0" name=""/>
+                      <p:cNvPicPr/>
+                      <p:nvPr/>
+                    </p:nvPicPr>
+                    <p:blipFill>
+                      <a:blip r:embed="rId7"/>
+                      <a:stretch>
+                        <a:fillRect/>
+                      </a:stretch>
+                    </p:blipFill>
+                    <p:spPr>
+                      <a:xfrm>
+                        <a:off x="2895600" y="1752600"/>
+                        <a:ext cx="2590800" cy="1582738"/>
+                      </a:xfrm>
+                      <a:prstGeom prst="rect">
+                        <a:avLst/>
+                      </a:prstGeom>
+                    </p:spPr>
+                  </p:pic>
+                </p:oleObj>
+              </mc:Fallback>
+            </mc:AlternateContent>
+          </a:graphicData>
+        </a:graphic>
+      </p:graphicFrame>
+      <p:graphicFrame>
+        <p:nvGraphicFramePr>
+          <p:cNvPr id="5" name="Object 4"/>
+          <p:cNvGraphicFramePr>
+            <a:graphicFrameLocks noChangeAspect="1"/>
+          </p:cNvGraphicFramePr>
+          <p:nvPr>
+            <p:extLst>
+              <p:ext uri="{D42A27DB-BD31-4B8C-83A1-F6EECF244321}">
+                <p14:modId xmlns:p14="http://schemas.microsoft.com/office/powerpoint/2010/main" val="1101636306"/>
+              </p:ext>
+            </p:extLst>
+          </p:nvPr>
+        </p:nvGraphicFramePr>
+        <p:xfrm>
+          <a:off x="3733800" y="4114800"/>
+          <a:ext cx="1055688" cy="482600"/>
+        </p:xfrm>
+        <a:graphic>
+          <a:graphicData uri="http://schemas.openxmlformats.org/presentationml/2006/ole">
+            <mc:AlternateContent xmlns:mc="http://schemas.openxmlformats.org/markup-compatibility/2006">
+              <mc:Choice xmlns:v="urn:schemas-microsoft-com:vml" Requires="v">
+                <p:oleObj spid="_x0000_s33795" name="Equation" r:id="rId8" imgW="444500" imgH="203200" progId="Equation.3">
+                  <p:embed/>
+                </p:oleObj>
+              </mc:Choice>
+              <mc:Fallback>
+                <p:oleObj name="Equation" r:id="rId8" imgW="444500" imgH="203200" progId="Equation.3">
+                  <p:embed/>
+                  <p:pic>
+                    <p:nvPicPr>
+                      <p:cNvPr id="0" name=""/>
+                      <p:cNvPicPr/>
+                      <p:nvPr/>
+                    </p:nvPicPr>
+                    <p:blipFill>
+                      <a:blip r:embed="rId9"/>
+                      <a:stretch>
+                        <a:fillRect/>
+                      </a:stretch>
+                    </p:blipFill>
+                    <p:spPr>
+                      <a:xfrm>
+                        <a:off x="3733800" y="4114800"/>
+                        <a:ext cx="1055688" cy="482600"/>
+                      </a:xfrm>
+                      <a:prstGeom prst="rect">
+                        <a:avLst/>
+                      </a:prstGeom>
+                    </p:spPr>
+                  </p:pic>
+                </p:oleObj>
+              </mc:Fallback>
+            </mc:AlternateContent>
+          </a:graphicData>
+        </a:graphic>
+      </p:graphicFrame>
+      <p:graphicFrame>
+        <p:nvGraphicFramePr>
+          <p:cNvPr id="14" name="Object 13"/>
+          <p:cNvGraphicFramePr>
+            <a:graphicFrameLocks noChangeAspect="1"/>
+          </p:cNvGraphicFramePr>
+          <p:nvPr>
+            <p:extLst>
+              <p:ext uri="{D42A27DB-BD31-4B8C-83A1-F6EECF244321}">
+                <p14:modId xmlns:p14="http://schemas.microsoft.com/office/powerpoint/2010/main" val="614429116"/>
+              </p:ext>
+            </p:extLst>
+          </p:nvPr>
+        </p:nvGraphicFramePr>
+        <p:xfrm>
+          <a:off x="3975100" y="3505200"/>
+          <a:ext cx="573088" cy="482600"/>
+        </p:xfrm>
+        <a:graphic>
+          <a:graphicData uri="http://schemas.openxmlformats.org/presentationml/2006/ole">
+            <mc:AlternateContent xmlns:mc="http://schemas.openxmlformats.org/markup-compatibility/2006">
+              <mc:Choice xmlns:v="urn:schemas-microsoft-com:vml" Requires="v">
+                <p:oleObj spid="_x0000_s33796" name="Equation" r:id="rId10" imgW="241300" imgH="203200" progId="Equation.3">
+                  <p:embed/>
+                </p:oleObj>
+              </mc:Choice>
+              <mc:Fallback>
+                <p:oleObj name="Equation" r:id="rId10" imgW="241300" imgH="203200" progId="Equation.3">
+                  <p:embed/>
+                  <p:pic>
+                    <p:nvPicPr>
+                      <p:cNvPr id="0" name=""/>
+                      <p:cNvPicPr/>
+                      <p:nvPr/>
+                    </p:nvPicPr>
+                    <p:blipFill>
+                      <a:blip r:embed="rId11"/>
+                      <a:stretch>
+                        <a:fillRect/>
+                      </a:stretch>
+                    </p:blipFill>
+                    <p:spPr>
+                      <a:xfrm>
+                        <a:off x="3975100" y="3505200"/>
+                        <a:ext cx="573088" cy="482600"/>
+                      </a:xfrm>
+                      <a:prstGeom prst="rect">
+                        <a:avLst/>
+                      </a:prstGeom>
+                    </p:spPr>
+                  </p:pic>
+                </p:oleObj>
+              </mc:Fallback>
+            </mc:AlternateContent>
+          </a:graphicData>
+        </a:graphic>
+      </p:graphicFrame>
+    </p:spTree>
+    <p:extLst>
+      <p:ext uri="{BB962C8B-B14F-4D97-AF65-F5344CB8AC3E}">
+        <p14:creationId xmlns:p14="http://schemas.microsoft.com/office/powerpoint/2010/main" val="2025281045"/>
+      </p:ext>
+    </p:extLst>
+  </p:cSld>
+  <p:clrMapOvr>
+    <a:masterClrMapping/>
+  </p:clrMapOvr>
+  <p:timing>
+    <p:tnLst>
+      <p:par>
+        <p:cTn xmlns:p14="http://schemas.microsoft.com/office/powerpoint/2010/main" id="1" dur="indefinite" restart="never" nodeType="tmRoot"/>
+      </p:par>
+    </p:tnLst>
+  </p:timing>
+</p:sld>
+</file>
+
+<file path=ppt/slides/slide8.xml><?xml version="1.0" encoding="utf-8"?>
+<p:sld xmlns:a="http://schemas.openxmlformats.org/drawingml/2006/main" xmlns:r="http://schemas.openxmlformats.org/officeDocument/2006/relationships" xmlns:p="http://schemas.openxmlformats.org/presentationml/2006/main">
+  <p:cSld>
+    <p:spTree>
+      <p:nvGrpSpPr>
+        <p:cNvPr id="1" name=""/>
+        <p:cNvGrpSpPr/>
+        <p:nvPr/>
+      </p:nvGrpSpPr>
+      <p:grpSpPr>
+        <a:xfrm>
+          <a:off x="0" y="0"/>
+          <a:ext cx="0" cy="0"/>
+          <a:chOff x="0" y="0"/>
+          <a:chExt cx="0" cy="0"/>
+        </a:xfrm>
+      </p:grpSpPr>
+      <p:sp>
+        <p:nvSpPr>
+          <p:cNvPr id="2" name="Title 1"/>
+          <p:cNvSpPr>
+            <a:spLocks noGrp="1"/>
+          </p:cNvSpPr>
+          <p:nvPr>
+            <p:ph type="ctrTitle"/>
+          </p:nvPr>
+        </p:nvSpPr>
+        <p:spPr>
+          <a:xfrm>
+            <a:off x="609600" y="-152400"/>
+            <a:ext cx="7772400" cy="762000"/>
+          </a:xfrm>
+        </p:spPr>
+        <p:txBody>
+          <a:bodyPr>
+            <a:normAutofit/>
+          </a:bodyPr>
+          <a:lstStyle/>
+          <a:p>
+            <a:r>
+              <a:rPr lang="en-US" sz="3200" dirty="0" smtClean="0">
+                <a:solidFill>
+                  <a:schemeClr val="accent2">
+                    <a:lumMod val="75000"/>
+                  </a:schemeClr>
+                </a:solidFill>
+              </a:rPr>
+              <a:t>Sampler with unknown variances</a:t>
+            </a:r>
+            <a:endParaRPr lang="en-US" sz="3200" dirty="0">
+              <a:solidFill>
+                <a:schemeClr val="accent2">
+                  <a:lumMod val="75000"/>
+                </a:schemeClr>
+              </a:solidFill>
+            </a:endParaRPr>
+          </a:p>
+        </p:txBody>
+      </p:sp>
+      <p:sp>
+        <p:nvSpPr>
+          <p:cNvPr id="4" name="Footer Placeholder 3"/>
+          <p:cNvSpPr>
+            <a:spLocks noGrp="1"/>
+          </p:cNvSpPr>
+          <p:nvPr>
+            <p:ph type="ftr" sz="quarter" idx="11"/>
+          </p:nvPr>
+        </p:nvSpPr>
+        <p:spPr>
+          <a:xfrm>
+            <a:off x="3124200" y="6569075"/>
+            <a:ext cx="2895600" cy="365125"/>
+          </a:xfrm>
+        </p:spPr>
+        <p:txBody>
+          <a:bodyPr/>
+          <a:lstStyle/>
+          <a:p>
+            <a:r>
+              <a:rPr lang="en-US" dirty="0" smtClean="0">
+                <a:solidFill>
+                  <a:schemeClr val="accent1"/>
+                </a:solidFill>
+              </a:rPr>
+              <a:t>STT 465, MSU, Fall, 2015</a:t>
+            </a:r>
+            <a:endParaRPr lang="en-US" dirty="0">
+              <a:solidFill>
+                <a:schemeClr val="accent1"/>
+              </a:solidFill>
+            </a:endParaRPr>
+          </a:p>
+        </p:txBody>
+      </p:sp>
+      <p:sp>
+        <p:nvSpPr>
+          <p:cNvPr id="6" name="TextBox 5"/>
+          <p:cNvSpPr txBox="1"/>
+          <p:nvPr/>
+        </p:nvSpPr>
+        <p:spPr>
+          <a:xfrm>
+            <a:off x="381000" y="605908"/>
+            <a:ext cx="8077200" cy="5940089"/>
+          </a:xfrm>
+          <a:prstGeom prst="rect">
+            <a:avLst/>
+          </a:prstGeom>
+          <a:noFill/>
+          <a:ln>
+            <a:solidFill>
+              <a:srgbClr val="800000"/>
+            </a:solidFill>
+            <a:prstDash val="sysDash"/>
+          </a:ln>
+        </p:spPr>
+        <p:txBody>
+          <a:bodyPr wrap="square" rtlCol="0">
+            <a:spAutoFit/>
+          </a:bodyPr>
+          <a:lstStyle/>
+          <a:p>
+            <a:r>
+              <a:rPr lang="en-US" sz="2000" b="1" u="sng" dirty="0" smtClean="0">
+                <a:solidFill>
+                  <a:schemeClr val="accent1">
+                    <a:lumMod val="75000"/>
+                  </a:schemeClr>
+                </a:solidFill>
+              </a:rPr>
+              <a:t>Likelihood</a:t>
+            </a:r>
+            <a:endParaRPr lang="en-US" sz="2000" b="1" u="sng" dirty="0">
+              <a:solidFill>
+                <a:schemeClr val="accent1">
+                  <a:lumMod val="75000"/>
+                </a:schemeClr>
+              </a:solidFill>
+            </a:endParaRPr>
+          </a:p>
+          <a:p>
+            <a:endParaRPr lang="en-US" dirty="0">
+              <a:solidFill>
+                <a:schemeClr val="accent1">
+                  <a:lumMod val="75000"/>
+                </a:schemeClr>
+              </a:solidFill>
+            </a:endParaRPr>
+          </a:p>
+          <a:p>
+            <a:r>
+              <a:rPr lang="en-US" b="1" u="sng" dirty="0" smtClean="0">
+                <a:solidFill>
+                  <a:schemeClr val="accent1">
+                    <a:lumMod val="75000"/>
+                  </a:schemeClr>
+                </a:solidFill>
+              </a:rPr>
+              <a:t>Semi-conjugate prior</a:t>
+            </a:r>
+            <a:endParaRPr lang="en-US" dirty="0" smtClean="0">
+              <a:solidFill>
+                <a:schemeClr val="accent1">
+                  <a:lumMod val="75000"/>
+                </a:schemeClr>
+              </a:solidFill>
+            </a:endParaRPr>
+          </a:p>
+          <a:p>
+            <a:r>
+              <a:rPr lang="en-US" dirty="0" smtClean="0">
+                <a:solidFill>
+                  <a:schemeClr val="accent1">
+                    <a:lumMod val="75000"/>
+                  </a:schemeClr>
+                </a:solidFill>
+              </a:rPr>
+              <a:t>  </a:t>
+            </a:r>
+          </a:p>
+          <a:p>
+            <a:endParaRPr lang="en-US" dirty="0">
+              <a:solidFill>
+                <a:schemeClr val="accent1">
+                  <a:lumMod val="75000"/>
+                </a:schemeClr>
+              </a:solidFill>
+            </a:endParaRPr>
+          </a:p>
+          <a:p>
+            <a:endParaRPr lang="en-US" dirty="0" smtClean="0">
+              <a:solidFill>
+                <a:schemeClr val="accent1">
+                  <a:lumMod val="75000"/>
+                </a:schemeClr>
+              </a:solidFill>
+            </a:endParaRPr>
+          </a:p>
+          <a:p>
+            <a:endParaRPr lang="en-US" dirty="0">
+              <a:solidFill>
+                <a:schemeClr val="accent1">
+                  <a:lumMod val="75000"/>
+                </a:schemeClr>
+              </a:solidFill>
+            </a:endParaRPr>
+          </a:p>
+          <a:p>
+            <a:endParaRPr lang="en-US" dirty="0" smtClean="0">
+              <a:solidFill>
+                <a:schemeClr val="accent1">
+                  <a:lumMod val="75000"/>
+                </a:schemeClr>
+              </a:solidFill>
+            </a:endParaRPr>
+          </a:p>
+          <a:p>
+            <a:endParaRPr lang="en-US" dirty="0">
+              <a:solidFill>
+                <a:schemeClr val="accent1">
+                  <a:lumMod val="75000"/>
+                </a:schemeClr>
+              </a:solidFill>
+            </a:endParaRPr>
+          </a:p>
+          <a:p>
+            <a:endParaRPr lang="en-US" dirty="0" smtClean="0">
+              <a:solidFill>
+                <a:schemeClr val="accent1">
+                  <a:lumMod val="75000"/>
+                </a:schemeClr>
+              </a:solidFill>
+            </a:endParaRPr>
+          </a:p>
+          <a:p>
+            <a:endParaRPr lang="en-US" dirty="0">
+              <a:solidFill>
+                <a:schemeClr val="accent1">
+                  <a:lumMod val="75000"/>
+                </a:schemeClr>
+              </a:solidFill>
+            </a:endParaRPr>
+          </a:p>
+          <a:p>
+            <a:endParaRPr lang="en-US" dirty="0" smtClean="0">
+              <a:solidFill>
+                <a:schemeClr val="accent1">
+                  <a:lumMod val="75000"/>
+                </a:schemeClr>
+              </a:solidFill>
+            </a:endParaRPr>
+          </a:p>
+          <a:p>
+            <a:endParaRPr lang="en-US" dirty="0">
+              <a:solidFill>
+                <a:schemeClr val="accent1">
+                  <a:lumMod val="75000"/>
+                </a:schemeClr>
+              </a:solidFill>
+            </a:endParaRPr>
+          </a:p>
+          <a:p>
+            <a:endParaRPr lang="en-US" dirty="0" smtClean="0">
+              <a:solidFill>
+                <a:schemeClr val="accent1">
+                  <a:lumMod val="75000"/>
+                </a:schemeClr>
+              </a:solidFill>
+            </a:endParaRPr>
+          </a:p>
+          <a:p>
+            <a:endParaRPr lang="en-US" dirty="0">
+              <a:solidFill>
+                <a:schemeClr val="accent1">
+                  <a:lumMod val="75000"/>
+                </a:schemeClr>
+              </a:solidFill>
+            </a:endParaRPr>
+          </a:p>
+          <a:p>
+            <a:endParaRPr lang="en-US" dirty="0" smtClean="0">
+              <a:solidFill>
+                <a:schemeClr val="accent1">
+                  <a:lumMod val="75000"/>
+                </a:schemeClr>
+              </a:solidFill>
+            </a:endParaRPr>
+          </a:p>
+          <a:p>
+            <a:endParaRPr lang="en-US" dirty="0">
+              <a:solidFill>
+                <a:schemeClr val="accent1">
+                  <a:lumMod val="75000"/>
+                </a:schemeClr>
+              </a:solidFill>
+            </a:endParaRPr>
+          </a:p>
+          <a:p>
+            <a:endParaRPr lang="en-US" dirty="0" smtClean="0">
+              <a:solidFill>
+                <a:schemeClr val="accent1">
+                  <a:lumMod val="75000"/>
+                </a:schemeClr>
+              </a:solidFill>
+            </a:endParaRPr>
+          </a:p>
+          <a:p>
+            <a:endParaRPr lang="en-US" dirty="0">
+              <a:solidFill>
+                <a:schemeClr val="accent1">
+                  <a:lumMod val="75000"/>
+                </a:schemeClr>
+              </a:solidFill>
+            </a:endParaRPr>
+          </a:p>
+          <a:p>
+            <a:endParaRPr lang="en-US" dirty="0" smtClean="0">
+              <a:solidFill>
+                <a:schemeClr val="accent1">
+                  <a:lumMod val="75000"/>
+                </a:schemeClr>
+              </a:solidFill>
+            </a:endParaRPr>
+          </a:p>
+          <a:p>
+            <a:endParaRPr lang="en-US" dirty="0">
+              <a:solidFill>
+                <a:schemeClr val="accent1">
+                  <a:lumMod val="75000"/>
+                </a:schemeClr>
+              </a:solidFill>
+            </a:endParaRPr>
+          </a:p>
+        </p:txBody>
+      </p:sp>
+      <p:graphicFrame>
+        <p:nvGraphicFramePr>
+          <p:cNvPr id="9" name="Object 8"/>
+          <p:cNvGraphicFramePr>
+            <a:graphicFrameLocks noChangeAspect="1"/>
+          </p:cNvGraphicFramePr>
+          <p:nvPr>
+            <p:extLst>
+              <p:ext uri="{D42A27DB-BD31-4B8C-83A1-F6EECF244321}">
+                <p14:modId xmlns:p14="http://schemas.microsoft.com/office/powerpoint/2010/main" val="3581833389"/>
+              </p:ext>
+            </p:extLst>
+          </p:nvPr>
+        </p:nvGraphicFramePr>
+        <p:xfrm>
+          <a:off x="1695450" y="609600"/>
+          <a:ext cx="2952750" cy="571500"/>
+        </p:xfrm>
+        <a:graphic>
+          <a:graphicData uri="http://schemas.openxmlformats.org/presentationml/2006/ole">
+            <mc:AlternateContent xmlns:mc="http://schemas.openxmlformats.org/markup-compatibility/2006">
+              <mc:Choice xmlns:v="urn:schemas-microsoft-com:vml" Requires="v">
+                <p:oleObj spid="_x0000_s34817" name="Equation" r:id="rId4" imgW="1511300" imgH="292100" progId="Equation.3">
+                  <p:embed/>
+                </p:oleObj>
+              </mc:Choice>
+              <mc:Fallback>
+                <p:oleObj name="Equation" r:id="rId4" imgW="1511300" imgH="292100" progId="Equation.3">
+                  <p:embed/>
+                  <p:pic>
+                    <p:nvPicPr>
+                      <p:cNvPr id="0" name=""/>
+                      <p:cNvPicPr/>
+                      <p:nvPr/>
+                    </p:nvPicPr>
+                    <p:blipFill>
+                      <a:blip r:embed="rId5"/>
+                      <a:stretch>
+                        <a:fillRect/>
+                      </a:stretch>
+                    </p:blipFill>
+                    <p:spPr>
+                      <a:xfrm>
+                        <a:off x="1695450" y="609600"/>
+                        <a:ext cx="2952750" cy="571500"/>
+                      </a:xfrm>
+                      <a:prstGeom prst="rect">
+                        <a:avLst/>
+                      </a:prstGeom>
+                    </p:spPr>
+                  </p:pic>
+                </p:oleObj>
+              </mc:Fallback>
+            </mc:AlternateContent>
+          </a:graphicData>
+        </a:graphic>
+      </p:graphicFrame>
+    </p:spTree>
+    <p:extLst>
+      <p:ext uri="{BB962C8B-B14F-4D97-AF65-F5344CB8AC3E}">
+        <p14:creationId xmlns:p14="http://schemas.microsoft.com/office/powerpoint/2010/main" val="1559038842"/>
+      </p:ext>
+    </p:extLst>
+  </p:cSld>
+  <p:clrMapOvr>
+    <a:masterClrMapping/>
+  </p:clrMapOvr>
+  <p:timing>
+    <p:tnLst>
+      <p:par>
+        <p:cTn xmlns:p14="http://schemas.microsoft.com/office/powerpoint/2010/main" id="1" dur="indefinite" restart="never" nodeType="tmRoot"/>
+      </p:par>
+    </p:tnLst>
   </p:timing>
 </p:sld>
 </file>

</xml_diff>

<commit_message>
adding gibbs sampler linear model
</commit_message>
<xml_diff>
--- a/STT465_11.pptx
+++ b/STT465_11.pptx
@@ -5,7 +5,7 @@
     <p:sldMasterId id="2147483648" r:id="rId1"/>
   </p:sldMasterIdLst>
   <p:notesMasterIdLst>
-    <p:notesMasterId r:id="rId10"/>
+    <p:notesMasterId r:id="rId9"/>
   </p:notesMasterIdLst>
   <p:sldIdLst>
     <p:sldId id="338" r:id="rId2"/>
@@ -15,7 +15,6 @@
     <p:sldId id="348" r:id="rId6"/>
     <p:sldId id="349" r:id="rId7"/>
     <p:sldId id="350" r:id="rId8"/>
-    <p:sldId id="351" r:id="rId9"/>
   </p:sldIdLst>
   <p:sldSz cx="9144000" cy="6858000" type="screen4x3"/>
   <p:notesSz cx="6858000" cy="9144000"/>
@@ -206,7 +205,7 @@
             <a:fld id="{EC2AD4C0-0FC1-44D9-A720-D776D6428221}" type="datetimeFigureOut">
               <a:rPr lang="en-US" smtClean="0"/>
               <a:pPr/>
-              <a:t>11/4/15</a:t>
+              <a:t>11/9/15</a:t>
             </a:fld>
             <a:endParaRPr lang="en-US"/>
           </a:p>
@@ -1051,88 +1050,6 @@
 </p:notes>
 </file>
 
-<file path=ppt/notesSlides/notesSlide8.xml><?xml version="1.0" encoding="utf-8"?>
-<p:notes xmlns:a="http://schemas.openxmlformats.org/drawingml/2006/main" xmlns:r="http://schemas.openxmlformats.org/officeDocument/2006/relationships" xmlns:p="http://schemas.openxmlformats.org/presentationml/2006/main">
-  <p:cSld>
-    <p:spTree>
-      <p:nvGrpSpPr>
-        <p:cNvPr id="1" name=""/>
-        <p:cNvGrpSpPr/>
-        <p:nvPr/>
-      </p:nvGrpSpPr>
-      <p:grpSpPr>
-        <a:xfrm>
-          <a:off x="0" y="0"/>
-          <a:ext cx="0" cy="0"/>
-          <a:chOff x="0" y="0"/>
-          <a:chExt cx="0" cy="0"/>
-        </a:xfrm>
-      </p:grpSpPr>
-      <p:sp>
-        <p:nvSpPr>
-          <p:cNvPr id="2" name="Slide Image Placeholder 1"/>
-          <p:cNvSpPr>
-            <a:spLocks noGrp="1" noRot="1" noChangeAspect="1"/>
-          </p:cNvSpPr>
-          <p:nvPr>
-            <p:ph type="sldImg"/>
-          </p:nvPr>
-        </p:nvSpPr>
-        <p:spPr/>
-      </p:sp>
-      <p:sp>
-        <p:nvSpPr>
-          <p:cNvPr id="3" name="Notes Placeholder 2"/>
-          <p:cNvSpPr>
-            <a:spLocks noGrp="1"/>
-          </p:cNvSpPr>
-          <p:nvPr>
-            <p:ph type="body" idx="1"/>
-          </p:nvPr>
-        </p:nvSpPr>
-        <p:spPr/>
-        <p:txBody>
-          <a:bodyPr>
-            <a:normAutofit/>
-          </a:bodyPr>
-          <a:lstStyle/>
-          <a:p>
-            <a:endParaRPr lang="en-US" dirty="0"/>
-          </a:p>
-        </p:txBody>
-      </p:sp>
-      <p:sp>
-        <p:nvSpPr>
-          <p:cNvPr id="4" name="Slide Number Placeholder 3"/>
-          <p:cNvSpPr>
-            <a:spLocks noGrp="1"/>
-          </p:cNvSpPr>
-          <p:nvPr>
-            <p:ph type="sldNum" sz="quarter" idx="10"/>
-          </p:nvPr>
-        </p:nvSpPr>
-        <p:spPr/>
-        <p:txBody>
-          <a:bodyPr/>
-          <a:lstStyle/>
-          <a:p>
-            <a:fld id="{CACBEE2F-8C26-493F-9430-82D1D1B7C623}" type="slidenum">
-              <a:rPr lang="en-US" smtClean="0"/>
-              <a:pPr/>
-              <a:t>8</a:t>
-            </a:fld>
-            <a:endParaRPr lang="en-US"/>
-          </a:p>
-        </p:txBody>
-      </p:sp>
-    </p:spTree>
-  </p:cSld>
-  <p:clrMapOvr>
-    <a:masterClrMapping/>
-  </p:clrMapOvr>
-</p:notes>
-</file>
-
 <file path=ppt/slideLayouts/slideLayout1.xml><?xml version="1.0" encoding="utf-8"?>
 <p:sldLayout xmlns:a="http://schemas.openxmlformats.org/drawingml/2006/main" xmlns:r="http://schemas.openxmlformats.org/officeDocument/2006/relationships" xmlns:p="http://schemas.openxmlformats.org/presentationml/2006/main" type="title" preserve="1">
   <p:cSld name="Title Slide">
@@ -1315,7 +1232,7 @@
             <a:fld id="{F9C811E6-0209-4075-80E7-F5953C8ECEE3}" type="datetime1">
               <a:rPr lang="en-US" smtClean="0"/>
               <a:pPr/>
-              <a:t>11/4/15</a:t>
+              <a:t>11/9/15</a:t>
             </a:fld>
             <a:endParaRPr lang="en-US"/>
           </a:p>
@@ -1486,7 +1403,7 @@
             <a:fld id="{648E6BB1-E6D9-4EE7-828F-046F7223761D}" type="datetime1">
               <a:rPr lang="en-US" smtClean="0"/>
               <a:pPr/>
-              <a:t>11/4/15</a:t>
+              <a:t>11/9/15</a:t>
             </a:fld>
             <a:endParaRPr lang="en-US"/>
           </a:p>
@@ -1667,7 +1584,7 @@
             <a:fld id="{B4B9C580-A780-4D76-B2D1-C34F1DA97DF0}" type="datetime1">
               <a:rPr lang="en-US" smtClean="0"/>
               <a:pPr/>
-              <a:t>11/4/15</a:t>
+              <a:t>11/9/15</a:t>
             </a:fld>
             <a:endParaRPr lang="en-US"/>
           </a:p>
@@ -1838,7 +1755,7 @@
             <a:fld id="{EB19DDAF-3255-4785-974C-BB4FAF02D67E}" type="datetime1">
               <a:rPr lang="en-US" smtClean="0"/>
               <a:pPr/>
-              <a:t>11/4/15</a:t>
+              <a:t>11/9/15</a:t>
             </a:fld>
             <a:endParaRPr lang="en-US"/>
           </a:p>
@@ -2085,7 +2002,7 @@
             <a:fld id="{C344AF86-11D1-4E84-BA60-17130236FDAA}" type="datetime1">
               <a:rPr lang="en-US" smtClean="0"/>
               <a:pPr/>
-              <a:t>11/4/15</a:t>
+              <a:t>11/9/15</a:t>
             </a:fld>
             <a:endParaRPr lang="en-US"/>
           </a:p>
@@ -2374,7 +2291,7 @@
             <a:fld id="{A8DD670F-7E07-4783-A6F8-B28127B5AF4A}" type="datetime1">
               <a:rPr lang="en-US" smtClean="0"/>
               <a:pPr/>
-              <a:t>11/4/15</a:t>
+              <a:t>11/9/15</a:t>
             </a:fld>
             <a:endParaRPr lang="en-US"/>
           </a:p>
@@ -2797,7 +2714,7 @@
             <a:fld id="{92676DD9-688F-48EE-8233-B3B78BDDA63D}" type="datetime1">
               <a:rPr lang="en-US" smtClean="0"/>
               <a:pPr/>
-              <a:t>11/4/15</a:t>
+              <a:t>11/9/15</a:t>
             </a:fld>
             <a:endParaRPr lang="en-US"/>
           </a:p>
@@ -2916,7 +2833,7 @@
             <a:fld id="{F6CC4A83-AE34-48B8-B90E-70388FDBF0F7}" type="datetime1">
               <a:rPr lang="en-US" smtClean="0"/>
               <a:pPr/>
-              <a:t>11/4/15</a:t>
+              <a:t>11/9/15</a:t>
             </a:fld>
             <a:endParaRPr lang="en-US"/>
           </a:p>
@@ -3012,7 +2929,7 @@
             <a:fld id="{510CA3E2-9601-488E-B92B-23013819BD02}" type="datetime1">
               <a:rPr lang="en-US" smtClean="0"/>
               <a:pPr/>
-              <a:t>11/4/15</a:t>
+              <a:t>11/9/15</a:t>
             </a:fld>
             <a:endParaRPr lang="en-US"/>
           </a:p>
@@ -3290,7 +3207,7 @@
             <a:fld id="{331F1CBD-358A-4E18-86FD-C337233E15F0}" type="datetime1">
               <a:rPr lang="en-US" smtClean="0"/>
               <a:pPr/>
-              <a:t>11/4/15</a:t>
+              <a:t>11/9/15</a:t>
             </a:fld>
             <a:endParaRPr lang="en-US"/>
           </a:p>
@@ -3544,7 +3461,7 @@
             <a:fld id="{3CB4F0D5-901F-4458-A8F8-F062616694B4}" type="datetime1">
               <a:rPr lang="en-US" smtClean="0"/>
               <a:pPr/>
-              <a:t>11/4/15</a:t>
+              <a:t>11/9/15</a:t>
             </a:fld>
             <a:endParaRPr lang="en-US"/>
           </a:p>
@@ -3758,7 +3675,7 @@
             <a:fld id="{F77D84EF-BDBF-448B-906E-D51D4CAF22DC}" type="datetime1">
               <a:rPr lang="en-US" smtClean="0"/>
               <a:pPr/>
-              <a:t>11/4/15</a:t>
+              <a:t>11/9/15</a:t>
             </a:fld>
             <a:endParaRPr lang="en-US"/>
           </a:p>
@@ -4193,17 +4110,7 @@
                   </a:schemeClr>
                 </a:solidFill>
               </a:rPr>
-              <a:t>Bayesian Multiple </a:t>
-            </a:r>
-            <a:r>
-              <a:rPr lang="en-US" sz="3200" dirty="0" smtClean="0">
-                <a:solidFill>
-                  <a:schemeClr val="accent2">
-                    <a:lumMod val="75000"/>
-                  </a:schemeClr>
-                </a:solidFill>
-              </a:rPr>
-              <a:t>Linear Regression: </a:t>
+              <a:t>Bayesian Multiple Linear Regression: </a:t>
             </a:r>
             <a:br>
               <a:rPr lang="en-US" sz="3200" dirty="0" smtClean="0">
@@ -4934,7 +4841,7 @@
           <a:graphicData uri="http://schemas.openxmlformats.org/presentationml/2006/ole">
             <mc:AlternateContent xmlns:mc="http://schemas.openxmlformats.org/markup-compatibility/2006">
               <mc:Choice xmlns:v="urn:schemas-microsoft-com:vml" Requires="v">
-                <p:oleObj spid="_x0000_s1081" name="Equation" r:id="rId4" imgW="1092200" imgH="330200" progId="Equation.3">
+                <p:oleObj spid="_x0000_s1089" name="Equation" r:id="rId4" imgW="1092200" imgH="330200" progId="Equation.3">
                   <p:embed/>
                 </p:oleObj>
               </mc:Choice>
@@ -4991,7 +4898,7 @@
           <a:graphicData uri="http://schemas.openxmlformats.org/presentationml/2006/ole">
             <mc:AlternateContent xmlns:mc="http://schemas.openxmlformats.org/markup-compatibility/2006">
               <mc:Choice xmlns:v="urn:schemas-microsoft-com:vml" Requires="v">
-                <p:oleObj spid="_x0000_s1082" name="Equation" r:id="rId6" imgW="1295400" imgH="266700" progId="Equation.3">
+                <p:oleObj spid="_x0000_s1090" name="Equation" r:id="rId6" imgW="1295400" imgH="266700" progId="Equation.3">
                   <p:embed/>
                 </p:oleObj>
               </mc:Choice>
@@ -5048,7 +4955,7 @@
           <a:graphicData uri="http://schemas.openxmlformats.org/presentationml/2006/ole">
             <mc:AlternateContent xmlns:mc="http://schemas.openxmlformats.org/markup-compatibility/2006">
               <mc:Choice xmlns:v="urn:schemas-microsoft-com:vml" Requires="v">
-                <p:oleObj spid="_x0000_s1083" name="Equation" r:id="rId8" imgW="1308100" imgH="342900" progId="Equation.3">
+                <p:oleObj spid="_x0000_s1091" name="Equation" r:id="rId8" imgW="1308100" imgH="342900" progId="Equation.3">
                   <p:embed/>
                 </p:oleObj>
               </mc:Choice>
@@ -5105,7 +5012,7 @@
           <a:graphicData uri="http://schemas.openxmlformats.org/presentationml/2006/ole">
             <mc:AlternateContent xmlns:mc="http://schemas.openxmlformats.org/markup-compatibility/2006">
               <mc:Choice xmlns:v="urn:schemas-microsoft-com:vml" Requires="v">
-                <p:oleObj spid="_x0000_s1084" name="Equation" r:id="rId10" imgW="723900" imgH="215900" progId="Equation.3">
+                <p:oleObj spid="_x0000_s1092" name="Equation" r:id="rId10" imgW="723900" imgH="215900" progId="Equation.3">
                   <p:embed/>
                 </p:oleObj>
               </mc:Choice>
@@ -5162,7 +5069,7 @@
           <a:graphicData uri="http://schemas.openxmlformats.org/presentationml/2006/ole">
             <mc:AlternateContent xmlns:mc="http://schemas.openxmlformats.org/markup-compatibility/2006">
               <mc:Choice xmlns:v="urn:schemas-microsoft-com:vml" Requires="v">
-                <p:oleObj spid="_x0000_s1085" name="Equation" r:id="rId12" imgW="673100" imgH="203200" progId="Equation.3">
+                <p:oleObj spid="_x0000_s1093" name="Equation" r:id="rId12" imgW="673100" imgH="203200" progId="Equation.3">
                   <p:embed/>
                 </p:oleObj>
               </mc:Choice>
@@ -5219,7 +5126,7 @@
           <a:graphicData uri="http://schemas.openxmlformats.org/presentationml/2006/ole">
             <mc:AlternateContent xmlns:mc="http://schemas.openxmlformats.org/markup-compatibility/2006">
               <mc:Choice xmlns:v="urn:schemas-microsoft-com:vml" Requires="v">
-                <p:oleObj spid="_x0000_s1086" name="Equation" r:id="rId14" imgW="1371600" imgH="241300" progId="Equation.3">
+                <p:oleObj spid="_x0000_s1094" name="Equation" r:id="rId14" imgW="1371600" imgH="241300" progId="Equation.3">
                   <p:embed/>
                 </p:oleObj>
               </mc:Choice>
@@ -5276,7 +5183,7 @@
           <a:graphicData uri="http://schemas.openxmlformats.org/presentationml/2006/ole">
             <mc:AlternateContent xmlns:mc="http://schemas.openxmlformats.org/markup-compatibility/2006">
               <mc:Choice xmlns:v="urn:schemas-microsoft-com:vml" Requires="v">
-                <p:oleObj spid="_x0000_s1087" name="Equation" r:id="rId16" imgW="1054100" imgH="342900" progId="Equation.3">
+                <p:oleObj spid="_x0000_s1095" name="Equation" r:id="rId16" imgW="1054100" imgH="342900" progId="Equation.3">
                   <p:embed/>
                 </p:oleObj>
               </mc:Choice>
@@ -5675,7 +5582,7 @@
           <a:graphicData uri="http://schemas.openxmlformats.org/presentationml/2006/ole">
             <mc:AlternateContent xmlns:mc="http://schemas.openxmlformats.org/markup-compatibility/2006">
               <mc:Choice xmlns:v="urn:schemas-microsoft-com:vml" Requires="v">
-                <p:oleObj spid="_x0000_s29723" name="Equation" r:id="rId4" imgW="3937000" imgH="673100" progId="Equation.3">
+                <p:oleObj spid="_x0000_s29726" name="Equation" r:id="rId4" imgW="3937000" imgH="673100" progId="Equation.3">
                   <p:embed/>
                 </p:oleObj>
               </mc:Choice>
@@ -5770,7 +5677,7 @@
           <a:graphicData uri="http://schemas.openxmlformats.org/presentationml/2006/ole">
             <mc:AlternateContent xmlns:mc="http://schemas.openxmlformats.org/markup-compatibility/2006">
               <mc:Choice xmlns:v="urn:schemas-microsoft-com:vml" Requires="v">
-                <p:oleObj spid="_x0000_s29724" name="Equation" r:id="rId6" imgW="1104900" imgH="279400" progId="Equation.3">
+                <p:oleObj spid="_x0000_s29727" name="Equation" r:id="rId6" imgW="1104900" imgH="279400" progId="Equation.3">
                   <p:embed/>
                 </p:oleObj>
               </mc:Choice>
@@ -6163,25 +6070,25 @@
           <p:nvPr>
             <p:extLst>
               <p:ext uri="{D42A27DB-BD31-4B8C-83A1-F6EECF244321}">
-                <p14:modId xmlns:p14="http://schemas.microsoft.com/office/powerpoint/2010/main" val="3720527045"/>
+                <p14:modId xmlns:p14="http://schemas.microsoft.com/office/powerpoint/2010/main" val="3012708040"/>
               </p:ext>
             </p:extLst>
           </p:nvPr>
         </p:nvGraphicFramePr>
         <p:xfrm>
-          <a:off x="533400" y="1143000"/>
-          <a:ext cx="7910513" cy="1309688"/>
+          <a:off x="384175" y="1130300"/>
+          <a:ext cx="8210550" cy="1336675"/>
         </p:xfrm>
         <a:graphic>
           <a:graphicData uri="http://schemas.openxmlformats.org/presentationml/2006/ole">
             <mc:AlternateContent xmlns:mc="http://schemas.openxmlformats.org/markup-compatibility/2006">
               <mc:Choice xmlns:v="urn:schemas-microsoft-com:vml" Requires="v">
-                <p:oleObj spid="_x0000_s28695" name="Equation" r:id="rId4" imgW="3683000" imgH="609600" progId="Equation.3">
+                <p:oleObj spid="_x0000_s28698" name="Equation" r:id="rId4" imgW="3822700" imgH="622300" progId="Equation.3">
                   <p:embed/>
                 </p:oleObj>
               </mc:Choice>
               <mc:Fallback>
-                <p:oleObj name="Equation" r:id="rId4" imgW="3683000" imgH="609600" progId="Equation.3">
+                <p:oleObj name="Equation" r:id="rId4" imgW="3822700" imgH="622300" progId="Equation.3">
                   <p:embed/>
                   <p:pic>
                     <p:nvPicPr>
@@ -6197,8 +6104,8 @@
                     </p:blipFill>
                     <p:spPr>
                       <a:xfrm>
-                        <a:off x="533400" y="1143000"/>
-                        <a:ext cx="7910513" cy="1309688"/>
+                        <a:off x="384175" y="1130300"/>
+                        <a:ext cx="8210550" cy="1336675"/>
                       </a:xfrm>
                       <a:prstGeom prst="rect">
                         <a:avLst/>
@@ -6233,7 +6140,7 @@
           <a:graphicData uri="http://schemas.openxmlformats.org/presentationml/2006/ole">
             <mc:AlternateContent xmlns:mc="http://schemas.openxmlformats.org/markup-compatibility/2006">
               <mc:Choice xmlns:v="urn:schemas-microsoft-com:vml" Requires="v">
-                <p:oleObj spid="_x0000_s28696" name="Equation" r:id="rId6" imgW="2844800" imgH="698500" progId="Equation.3">
+                <p:oleObj spid="_x0000_s28699" name="Equation" r:id="rId6" imgW="2844800" imgH="698500" progId="Equation.3">
                   <p:embed/>
                 </p:oleObj>
               </mc:Choice>
@@ -6665,7 +6572,7 @@
           <a:graphicData uri="http://schemas.openxmlformats.org/presentationml/2006/ole">
             <mc:AlternateContent xmlns:mc="http://schemas.openxmlformats.org/markup-compatibility/2006">
               <mc:Choice xmlns:v="urn:schemas-microsoft-com:vml" Requires="v">
-                <p:oleObj spid="_x0000_s30748" name="Equation" r:id="rId4" imgW="1562100" imgH="482600" progId="Equation.3">
+                <p:oleObj spid="_x0000_s30754" name="Equation" r:id="rId4" imgW="1562100" imgH="482600" progId="Equation.3">
                   <p:embed/>
                 </p:oleObj>
               </mc:Choice>
@@ -6722,7 +6629,7 @@
           <a:graphicData uri="http://schemas.openxmlformats.org/presentationml/2006/ole">
             <mc:AlternateContent xmlns:mc="http://schemas.openxmlformats.org/markup-compatibility/2006">
               <mc:Choice xmlns:v="urn:schemas-microsoft-com:vml" Requires="v">
-                <p:oleObj spid="_x0000_s30749" name="Equation" r:id="rId6" imgW="4000500" imgH="622300" progId="Equation.3">
+                <p:oleObj spid="_x0000_s30755" name="Equation" r:id="rId6" imgW="4000500" imgH="622300" progId="Equation.3">
                   <p:embed/>
                 </p:oleObj>
               </mc:Choice>
@@ -6779,7 +6686,7 @@
           <a:graphicData uri="http://schemas.openxmlformats.org/presentationml/2006/ole">
             <mc:AlternateContent xmlns:mc="http://schemas.openxmlformats.org/markup-compatibility/2006">
               <mc:Choice xmlns:v="urn:schemas-microsoft-com:vml" Requires="v">
-                <p:oleObj spid="_x0000_s30750" name="Equation" r:id="rId8" imgW="3378200" imgH="622300" progId="Equation.3">
+                <p:oleObj spid="_x0000_s30756" name="Equation" r:id="rId8" imgW="3378200" imgH="622300" progId="Equation.3">
                   <p:embed/>
                 </p:oleObj>
               </mc:Choice>
@@ -6836,7 +6743,7 @@
           <a:graphicData uri="http://schemas.openxmlformats.org/presentationml/2006/ole">
             <mc:AlternateContent xmlns:mc="http://schemas.openxmlformats.org/markup-compatibility/2006">
               <mc:Choice xmlns:v="urn:schemas-microsoft-com:vml" Requires="v">
-                <p:oleObj spid="_x0000_s30751" name="Equation" r:id="rId10" imgW="1244600" imgH="736600" progId="Equation.3">
+                <p:oleObj spid="_x0000_s30757" name="Equation" r:id="rId10" imgW="1244600" imgH="736600" progId="Equation.3">
                   <p:embed/>
                 </p:oleObj>
               </mc:Choice>
@@ -6893,7 +6800,7 @@
           <a:graphicData uri="http://schemas.openxmlformats.org/presentationml/2006/ole">
             <mc:AlternateContent xmlns:mc="http://schemas.openxmlformats.org/markup-compatibility/2006">
               <mc:Choice xmlns:v="urn:schemas-microsoft-com:vml" Requires="v">
-                <p:oleObj spid="_x0000_s30752" name="Equation" r:id="rId12" imgW="2006600" imgH="482600" progId="Equation.3">
+                <p:oleObj spid="_x0000_s30758" name="Equation" r:id="rId12" imgW="2006600" imgH="482600" progId="Equation.3">
                   <p:embed/>
                 </p:oleObj>
               </mc:Choice>
@@ -7316,7 +7223,7 @@
           <a:graphicData uri="http://schemas.openxmlformats.org/presentationml/2006/ole">
             <mc:AlternateContent xmlns:mc="http://schemas.openxmlformats.org/markup-compatibility/2006">
               <mc:Choice xmlns:v="urn:schemas-microsoft-com:vml" Requires="v">
-                <p:oleObj spid="_x0000_s31772" name="Equation" r:id="rId4" imgW="1562100" imgH="482600" progId="Equation.3">
+                <p:oleObj spid="_x0000_s31778" name="Equation" r:id="rId4" imgW="1562100" imgH="482600" progId="Equation.3">
                   <p:embed/>
                 </p:oleObj>
               </mc:Choice>
@@ -7373,7 +7280,7 @@
           <a:graphicData uri="http://schemas.openxmlformats.org/presentationml/2006/ole">
             <mc:AlternateContent xmlns:mc="http://schemas.openxmlformats.org/markup-compatibility/2006">
               <mc:Choice xmlns:v="urn:schemas-microsoft-com:vml" Requires="v">
-                <p:oleObj spid="_x0000_s31773" name="Equation" r:id="rId6" imgW="901700" imgH="292100" progId="Equation.3">
+                <p:oleObj spid="_x0000_s31779" name="Equation" r:id="rId6" imgW="901700" imgH="292100" progId="Equation.3">
                   <p:embed/>
                 </p:oleObj>
               </mc:Choice>
@@ -7430,7 +7337,7 @@
           <a:graphicData uri="http://schemas.openxmlformats.org/presentationml/2006/ole">
             <mc:AlternateContent xmlns:mc="http://schemas.openxmlformats.org/markup-compatibility/2006">
               <mc:Choice xmlns:v="urn:schemas-microsoft-com:vml" Requires="v">
-                <p:oleObj spid="_x0000_s31774" name="Equation" r:id="rId8" imgW="1206500" imgH="736600" progId="Equation.3">
+                <p:oleObj spid="_x0000_s31780" name="Equation" r:id="rId8" imgW="1206500" imgH="736600" progId="Equation.3">
                   <p:embed/>
                 </p:oleObj>
               </mc:Choice>
@@ -7487,7 +7394,7 @@
           <a:graphicData uri="http://schemas.openxmlformats.org/presentationml/2006/ole">
             <mc:AlternateContent xmlns:mc="http://schemas.openxmlformats.org/markup-compatibility/2006">
               <mc:Choice xmlns:v="urn:schemas-microsoft-com:vml" Requires="v">
-                <p:oleObj spid="_x0000_s31775" name="Equation" r:id="rId10" imgW="1447800" imgH="431800" progId="Equation.3">
+                <p:oleObj spid="_x0000_s31781" name="Equation" r:id="rId10" imgW="1447800" imgH="431800" progId="Equation.3">
                   <p:embed/>
                 </p:oleObj>
               </mc:Choice>
@@ -7544,7 +7451,7 @@
           <a:graphicData uri="http://schemas.openxmlformats.org/presentationml/2006/ole">
             <mc:AlternateContent xmlns:mc="http://schemas.openxmlformats.org/markup-compatibility/2006">
               <mc:Choice xmlns:v="urn:schemas-microsoft-com:vml" Requires="v">
-                <p:oleObj spid="_x0000_s31776" name="Equation" r:id="rId12" imgW="1993900" imgH="431800" progId="Equation.3">
+                <p:oleObj spid="_x0000_s31782" name="Equation" r:id="rId12" imgW="1993900" imgH="431800" progId="Equation.3">
                   <p:embed/>
                 </p:oleObj>
               </mc:Choice>
@@ -8275,7 +8182,7 @@
           <a:graphicData uri="http://schemas.openxmlformats.org/presentationml/2006/ole">
             <mc:AlternateContent xmlns:mc="http://schemas.openxmlformats.org/markup-compatibility/2006">
               <mc:Choice xmlns:v="urn:schemas-microsoft-com:vml" Requires="v">
-                <p:oleObj spid="_x0000_s33793" name="Equation" r:id="rId4" imgW="1562100" imgH="482600" progId="Equation.3">
+                <p:oleObj spid="_x0000_s33798" name="Equation" r:id="rId4" imgW="1562100" imgH="482600" progId="Equation.3">
                   <p:embed/>
                 </p:oleObj>
               </mc:Choice>
@@ -8332,7 +8239,7 @@
           <a:graphicData uri="http://schemas.openxmlformats.org/presentationml/2006/ole">
             <mc:AlternateContent xmlns:mc="http://schemas.openxmlformats.org/markup-compatibility/2006">
               <mc:Choice xmlns:v="urn:schemas-microsoft-com:vml" Requires="v">
-                <p:oleObj spid="_x0000_s33794" name="Equation" r:id="rId6" imgW="1206500" imgH="736600" progId="Equation.3">
+                <p:oleObj spid="_x0000_s33799" name="Equation" r:id="rId6" imgW="1206500" imgH="736600" progId="Equation.3">
                   <p:embed/>
                 </p:oleObj>
               </mc:Choice>
@@ -8389,7 +8296,7 @@
           <a:graphicData uri="http://schemas.openxmlformats.org/presentationml/2006/ole">
             <mc:AlternateContent xmlns:mc="http://schemas.openxmlformats.org/markup-compatibility/2006">
               <mc:Choice xmlns:v="urn:schemas-microsoft-com:vml" Requires="v">
-                <p:oleObj spid="_x0000_s33795" name="Equation" r:id="rId8" imgW="444500" imgH="203200" progId="Equation.3">
+                <p:oleObj spid="_x0000_s33800" name="Equation" r:id="rId8" imgW="444500" imgH="203200" progId="Equation.3">
                   <p:embed/>
                 </p:oleObj>
               </mc:Choice>
@@ -8446,7 +8353,7 @@
           <a:graphicData uri="http://schemas.openxmlformats.org/presentationml/2006/ole">
             <mc:AlternateContent xmlns:mc="http://schemas.openxmlformats.org/markup-compatibility/2006">
               <mc:Choice xmlns:v="urn:schemas-microsoft-com:vml" Requires="v">
-                <p:oleObj spid="_x0000_s33796" name="Equation" r:id="rId10" imgW="241300" imgH="203200" progId="Equation.3">
+                <p:oleObj spid="_x0000_s33801" name="Equation" r:id="rId10" imgW="241300" imgH="203200" progId="Equation.3">
                   <p:embed/>
                 </p:oleObj>
               </mc:Choice>
@@ -8485,419 +8392,6 @@
     <p:extLst>
       <p:ext uri="{BB962C8B-B14F-4D97-AF65-F5344CB8AC3E}">
         <p14:creationId xmlns:p14="http://schemas.microsoft.com/office/powerpoint/2010/main" val="2025281045"/>
-      </p:ext>
-    </p:extLst>
-  </p:cSld>
-  <p:clrMapOvr>
-    <a:masterClrMapping/>
-  </p:clrMapOvr>
-  <p:timing>
-    <p:tnLst>
-      <p:par>
-        <p:cTn xmlns:p14="http://schemas.microsoft.com/office/powerpoint/2010/main" id="1" dur="indefinite" restart="never" nodeType="tmRoot"/>
-      </p:par>
-    </p:tnLst>
-  </p:timing>
-</p:sld>
-</file>
-
-<file path=ppt/slides/slide8.xml><?xml version="1.0" encoding="utf-8"?>
-<p:sld xmlns:a="http://schemas.openxmlformats.org/drawingml/2006/main" xmlns:r="http://schemas.openxmlformats.org/officeDocument/2006/relationships" xmlns:p="http://schemas.openxmlformats.org/presentationml/2006/main">
-  <p:cSld>
-    <p:spTree>
-      <p:nvGrpSpPr>
-        <p:cNvPr id="1" name=""/>
-        <p:cNvGrpSpPr/>
-        <p:nvPr/>
-      </p:nvGrpSpPr>
-      <p:grpSpPr>
-        <a:xfrm>
-          <a:off x="0" y="0"/>
-          <a:ext cx="0" cy="0"/>
-          <a:chOff x="0" y="0"/>
-          <a:chExt cx="0" cy="0"/>
-        </a:xfrm>
-      </p:grpSpPr>
-      <p:sp>
-        <p:nvSpPr>
-          <p:cNvPr id="2" name="Title 1"/>
-          <p:cNvSpPr>
-            <a:spLocks noGrp="1"/>
-          </p:cNvSpPr>
-          <p:nvPr>
-            <p:ph type="ctrTitle"/>
-          </p:nvPr>
-        </p:nvSpPr>
-        <p:spPr>
-          <a:xfrm>
-            <a:off x="609600" y="-152400"/>
-            <a:ext cx="7772400" cy="762000"/>
-          </a:xfrm>
-        </p:spPr>
-        <p:txBody>
-          <a:bodyPr>
-            <a:normAutofit/>
-          </a:bodyPr>
-          <a:lstStyle/>
-          <a:p>
-            <a:r>
-              <a:rPr lang="en-US" sz="3200" dirty="0" smtClean="0">
-                <a:solidFill>
-                  <a:schemeClr val="accent2">
-                    <a:lumMod val="75000"/>
-                  </a:schemeClr>
-                </a:solidFill>
-              </a:rPr>
-              <a:t>Sampler with unknown variances</a:t>
-            </a:r>
-            <a:endParaRPr lang="en-US" sz="3200" dirty="0">
-              <a:solidFill>
-                <a:schemeClr val="accent2">
-                  <a:lumMod val="75000"/>
-                </a:schemeClr>
-              </a:solidFill>
-            </a:endParaRPr>
-          </a:p>
-        </p:txBody>
-      </p:sp>
-      <p:sp>
-        <p:nvSpPr>
-          <p:cNvPr id="4" name="Footer Placeholder 3"/>
-          <p:cNvSpPr>
-            <a:spLocks noGrp="1"/>
-          </p:cNvSpPr>
-          <p:nvPr>
-            <p:ph type="ftr" sz="quarter" idx="11"/>
-          </p:nvPr>
-        </p:nvSpPr>
-        <p:spPr>
-          <a:xfrm>
-            <a:off x="3124200" y="6569075"/>
-            <a:ext cx="2895600" cy="365125"/>
-          </a:xfrm>
-        </p:spPr>
-        <p:txBody>
-          <a:bodyPr/>
-          <a:lstStyle/>
-          <a:p>
-            <a:r>
-              <a:rPr lang="en-US" dirty="0" smtClean="0">
-                <a:solidFill>
-                  <a:schemeClr val="accent1"/>
-                </a:solidFill>
-              </a:rPr>
-              <a:t>STT 465, MSU, Fall, 2015</a:t>
-            </a:r>
-            <a:endParaRPr lang="en-US" dirty="0">
-              <a:solidFill>
-                <a:schemeClr val="accent1"/>
-              </a:solidFill>
-            </a:endParaRPr>
-          </a:p>
-        </p:txBody>
-      </p:sp>
-      <p:sp>
-        <p:nvSpPr>
-          <p:cNvPr id="6" name="TextBox 5"/>
-          <p:cNvSpPr txBox="1"/>
-          <p:nvPr/>
-        </p:nvSpPr>
-        <p:spPr>
-          <a:xfrm>
-            <a:off x="381000" y="605908"/>
-            <a:ext cx="8077200" cy="5940089"/>
-          </a:xfrm>
-          <a:prstGeom prst="rect">
-            <a:avLst/>
-          </a:prstGeom>
-          <a:noFill/>
-          <a:ln>
-            <a:solidFill>
-              <a:srgbClr val="800000"/>
-            </a:solidFill>
-            <a:prstDash val="sysDash"/>
-          </a:ln>
-        </p:spPr>
-        <p:txBody>
-          <a:bodyPr wrap="square" rtlCol="0">
-            <a:spAutoFit/>
-          </a:bodyPr>
-          <a:lstStyle/>
-          <a:p>
-            <a:r>
-              <a:rPr lang="en-US" sz="2000" b="1" u="sng" dirty="0" smtClean="0">
-                <a:solidFill>
-                  <a:schemeClr val="accent1">
-                    <a:lumMod val="75000"/>
-                  </a:schemeClr>
-                </a:solidFill>
-              </a:rPr>
-              <a:t>Likelihood</a:t>
-            </a:r>
-            <a:endParaRPr lang="en-US" sz="2000" b="1" u="sng" dirty="0">
-              <a:solidFill>
-                <a:schemeClr val="accent1">
-                  <a:lumMod val="75000"/>
-                </a:schemeClr>
-              </a:solidFill>
-            </a:endParaRPr>
-          </a:p>
-          <a:p>
-            <a:endParaRPr lang="en-US" dirty="0">
-              <a:solidFill>
-                <a:schemeClr val="accent1">
-                  <a:lumMod val="75000"/>
-                </a:schemeClr>
-              </a:solidFill>
-            </a:endParaRPr>
-          </a:p>
-          <a:p>
-            <a:r>
-              <a:rPr lang="en-US" b="1" u="sng" dirty="0" smtClean="0">
-                <a:solidFill>
-                  <a:schemeClr val="accent1">
-                    <a:lumMod val="75000"/>
-                  </a:schemeClr>
-                </a:solidFill>
-              </a:rPr>
-              <a:t>Semi-conjugate prior</a:t>
-            </a:r>
-            <a:endParaRPr lang="en-US" dirty="0" smtClean="0">
-              <a:solidFill>
-                <a:schemeClr val="accent1">
-                  <a:lumMod val="75000"/>
-                </a:schemeClr>
-              </a:solidFill>
-            </a:endParaRPr>
-          </a:p>
-          <a:p>
-            <a:r>
-              <a:rPr lang="en-US" dirty="0" smtClean="0">
-                <a:solidFill>
-                  <a:schemeClr val="accent1">
-                    <a:lumMod val="75000"/>
-                  </a:schemeClr>
-                </a:solidFill>
-              </a:rPr>
-              <a:t>  </a:t>
-            </a:r>
-          </a:p>
-          <a:p>
-            <a:endParaRPr lang="en-US" dirty="0">
-              <a:solidFill>
-                <a:schemeClr val="accent1">
-                  <a:lumMod val="75000"/>
-                </a:schemeClr>
-              </a:solidFill>
-            </a:endParaRPr>
-          </a:p>
-          <a:p>
-            <a:endParaRPr lang="en-US" dirty="0" smtClean="0">
-              <a:solidFill>
-                <a:schemeClr val="accent1">
-                  <a:lumMod val="75000"/>
-                </a:schemeClr>
-              </a:solidFill>
-            </a:endParaRPr>
-          </a:p>
-          <a:p>
-            <a:endParaRPr lang="en-US" dirty="0">
-              <a:solidFill>
-                <a:schemeClr val="accent1">
-                  <a:lumMod val="75000"/>
-                </a:schemeClr>
-              </a:solidFill>
-            </a:endParaRPr>
-          </a:p>
-          <a:p>
-            <a:endParaRPr lang="en-US" dirty="0" smtClean="0">
-              <a:solidFill>
-                <a:schemeClr val="accent1">
-                  <a:lumMod val="75000"/>
-                </a:schemeClr>
-              </a:solidFill>
-            </a:endParaRPr>
-          </a:p>
-          <a:p>
-            <a:endParaRPr lang="en-US" dirty="0">
-              <a:solidFill>
-                <a:schemeClr val="accent1">
-                  <a:lumMod val="75000"/>
-                </a:schemeClr>
-              </a:solidFill>
-            </a:endParaRPr>
-          </a:p>
-          <a:p>
-            <a:endParaRPr lang="en-US" dirty="0" smtClean="0">
-              <a:solidFill>
-                <a:schemeClr val="accent1">
-                  <a:lumMod val="75000"/>
-                </a:schemeClr>
-              </a:solidFill>
-            </a:endParaRPr>
-          </a:p>
-          <a:p>
-            <a:endParaRPr lang="en-US" dirty="0">
-              <a:solidFill>
-                <a:schemeClr val="accent1">
-                  <a:lumMod val="75000"/>
-                </a:schemeClr>
-              </a:solidFill>
-            </a:endParaRPr>
-          </a:p>
-          <a:p>
-            <a:endParaRPr lang="en-US" dirty="0" smtClean="0">
-              <a:solidFill>
-                <a:schemeClr val="accent1">
-                  <a:lumMod val="75000"/>
-                </a:schemeClr>
-              </a:solidFill>
-            </a:endParaRPr>
-          </a:p>
-          <a:p>
-            <a:endParaRPr lang="en-US" dirty="0">
-              <a:solidFill>
-                <a:schemeClr val="accent1">
-                  <a:lumMod val="75000"/>
-                </a:schemeClr>
-              </a:solidFill>
-            </a:endParaRPr>
-          </a:p>
-          <a:p>
-            <a:endParaRPr lang="en-US" dirty="0" smtClean="0">
-              <a:solidFill>
-                <a:schemeClr val="accent1">
-                  <a:lumMod val="75000"/>
-                </a:schemeClr>
-              </a:solidFill>
-            </a:endParaRPr>
-          </a:p>
-          <a:p>
-            <a:endParaRPr lang="en-US" dirty="0">
-              <a:solidFill>
-                <a:schemeClr val="accent1">
-                  <a:lumMod val="75000"/>
-                </a:schemeClr>
-              </a:solidFill>
-            </a:endParaRPr>
-          </a:p>
-          <a:p>
-            <a:endParaRPr lang="en-US" dirty="0" smtClean="0">
-              <a:solidFill>
-                <a:schemeClr val="accent1">
-                  <a:lumMod val="75000"/>
-                </a:schemeClr>
-              </a:solidFill>
-            </a:endParaRPr>
-          </a:p>
-          <a:p>
-            <a:endParaRPr lang="en-US" dirty="0">
-              <a:solidFill>
-                <a:schemeClr val="accent1">
-                  <a:lumMod val="75000"/>
-                </a:schemeClr>
-              </a:solidFill>
-            </a:endParaRPr>
-          </a:p>
-          <a:p>
-            <a:endParaRPr lang="en-US" dirty="0" smtClean="0">
-              <a:solidFill>
-                <a:schemeClr val="accent1">
-                  <a:lumMod val="75000"/>
-                </a:schemeClr>
-              </a:solidFill>
-            </a:endParaRPr>
-          </a:p>
-          <a:p>
-            <a:endParaRPr lang="en-US" dirty="0">
-              <a:solidFill>
-                <a:schemeClr val="accent1">
-                  <a:lumMod val="75000"/>
-                </a:schemeClr>
-              </a:solidFill>
-            </a:endParaRPr>
-          </a:p>
-          <a:p>
-            <a:endParaRPr lang="en-US" dirty="0" smtClean="0">
-              <a:solidFill>
-                <a:schemeClr val="accent1">
-                  <a:lumMod val="75000"/>
-                </a:schemeClr>
-              </a:solidFill>
-            </a:endParaRPr>
-          </a:p>
-          <a:p>
-            <a:endParaRPr lang="en-US" dirty="0">
-              <a:solidFill>
-                <a:schemeClr val="accent1">
-                  <a:lumMod val="75000"/>
-                </a:schemeClr>
-              </a:solidFill>
-            </a:endParaRPr>
-          </a:p>
-        </p:txBody>
-      </p:sp>
-      <p:graphicFrame>
-        <p:nvGraphicFramePr>
-          <p:cNvPr id="9" name="Object 8"/>
-          <p:cNvGraphicFramePr>
-            <a:graphicFrameLocks noChangeAspect="1"/>
-          </p:cNvGraphicFramePr>
-          <p:nvPr>
-            <p:extLst>
-              <p:ext uri="{D42A27DB-BD31-4B8C-83A1-F6EECF244321}">
-                <p14:modId xmlns:p14="http://schemas.microsoft.com/office/powerpoint/2010/main" val="3581833389"/>
-              </p:ext>
-            </p:extLst>
-          </p:nvPr>
-        </p:nvGraphicFramePr>
-        <p:xfrm>
-          <a:off x="1695450" y="609600"/>
-          <a:ext cx="2952750" cy="571500"/>
-        </p:xfrm>
-        <a:graphic>
-          <a:graphicData uri="http://schemas.openxmlformats.org/presentationml/2006/ole">
-            <mc:AlternateContent xmlns:mc="http://schemas.openxmlformats.org/markup-compatibility/2006">
-              <mc:Choice xmlns:v="urn:schemas-microsoft-com:vml" Requires="v">
-                <p:oleObj spid="_x0000_s34817" name="Equation" r:id="rId4" imgW="1511300" imgH="292100" progId="Equation.3">
-                  <p:embed/>
-                </p:oleObj>
-              </mc:Choice>
-              <mc:Fallback>
-                <p:oleObj name="Equation" r:id="rId4" imgW="1511300" imgH="292100" progId="Equation.3">
-                  <p:embed/>
-                  <p:pic>
-                    <p:nvPicPr>
-                      <p:cNvPr id="0" name=""/>
-                      <p:cNvPicPr/>
-                      <p:nvPr/>
-                    </p:nvPicPr>
-                    <p:blipFill>
-                      <a:blip r:embed="rId5"/>
-                      <a:stretch>
-                        <a:fillRect/>
-                      </a:stretch>
-                    </p:blipFill>
-                    <p:spPr>
-                      <a:xfrm>
-                        <a:off x="1695450" y="609600"/>
-                        <a:ext cx="2952750" cy="571500"/>
-                      </a:xfrm>
-                      <a:prstGeom prst="rect">
-                        <a:avLst/>
-                      </a:prstGeom>
-                    </p:spPr>
-                  </p:pic>
-                </p:oleObj>
-              </mc:Fallback>
-            </mc:AlternateContent>
-          </a:graphicData>
-        </a:graphic>
-      </p:graphicFrame>
-    </p:spTree>
-    <p:extLst>
-      <p:ext uri="{BB962C8B-B14F-4D97-AF65-F5344CB8AC3E}">
-        <p14:creationId xmlns:p14="http://schemas.microsoft.com/office/powerpoint/2010/main" val="1559038842"/>
       </p:ext>
     </p:extLst>
   </p:cSld>

</xml_diff>